<commit_message>
all-slides.pdf code.zip gui.pdf gui.pptx
</commit_message>
<xml_diff>
--- a/ipsa/slides/gui.pptx
+++ b/ipsa/slides/gui.pptx
@@ -281,6 +281,52 @@
     </pc:docChg>
   </pc:docChgLst>
   <pc:docChgLst>
+    <pc:chgData name="Gerth Stølting Brodal" userId="04ef4784-6591-4f86-a140-f5c3b108582a" providerId="ADAL" clId="{939F7A13-0526-4A74-B066-813FB2B68789}"/>
+    <pc:docChg chg="undo custSel modSld">
+      <pc:chgData name="Gerth Stølting Brodal" userId="04ef4784-6591-4f86-a140-f5c3b108582a" providerId="ADAL" clId="{939F7A13-0526-4A74-B066-813FB2B68789}" dt="2024-05-01T04:58:26.549" v="28" actId="20577"/>
+      <pc:docMkLst>
+        <pc:docMk/>
+      </pc:docMkLst>
+      <pc:sldChg chg="modSp mod">
+        <pc:chgData name="Gerth Stølting Brodal" userId="04ef4784-6591-4f86-a140-f5c3b108582a" providerId="ADAL" clId="{939F7A13-0526-4A74-B066-813FB2B68789}" dt="2024-05-01T04:41:46.751" v="2" actId="20577"/>
+        <pc:sldMkLst>
+          <pc:docMk/>
+          <pc:sldMk cId="3472606578" sldId="720"/>
+        </pc:sldMkLst>
+        <pc:spChg chg="mod">
+          <ac:chgData name="Gerth Stølting Brodal" userId="04ef4784-6591-4f86-a140-f5c3b108582a" providerId="ADAL" clId="{939F7A13-0526-4A74-B066-813FB2B68789}" dt="2024-05-01T04:41:46.751" v="2" actId="20577"/>
+          <ac:spMkLst>
+            <pc:docMk/>
+            <pc:sldMk cId="3472606578" sldId="720"/>
+            <ac:spMk id="3" creationId="{00000000-0000-0000-0000-000000000000}"/>
+          </ac:spMkLst>
+        </pc:spChg>
+      </pc:sldChg>
+      <pc:sldChg chg="modNotesTx">
+        <pc:chgData name="Gerth Stølting Brodal" userId="04ef4784-6591-4f86-a140-f5c3b108582a" providerId="ADAL" clId="{939F7A13-0526-4A74-B066-813FB2B68789}" dt="2024-05-01T04:58:26.549" v="28" actId="20577"/>
+        <pc:sldMkLst>
+          <pc:docMk/>
+          <pc:sldMk cId="1890479042" sldId="725"/>
+        </pc:sldMkLst>
+      </pc:sldChg>
+      <pc:sldChg chg="modSp mod">
+        <pc:chgData name="Gerth Stølting Brodal" userId="04ef4784-6591-4f86-a140-f5c3b108582a" providerId="ADAL" clId="{939F7A13-0526-4A74-B066-813FB2B68789}" dt="2024-05-01T04:50:07.679" v="23" actId="5793"/>
+        <pc:sldMkLst>
+          <pc:docMk/>
+          <pc:sldMk cId="3483016115" sldId="726"/>
+        </pc:sldMkLst>
+        <pc:spChg chg="mod">
+          <ac:chgData name="Gerth Stølting Brodal" userId="04ef4784-6591-4f86-a140-f5c3b108582a" providerId="ADAL" clId="{939F7A13-0526-4A74-B066-813FB2B68789}" dt="2024-05-01T04:50:07.679" v="23" actId="5793"/>
+          <ac:spMkLst>
+            <pc:docMk/>
+            <pc:sldMk cId="3483016115" sldId="726"/>
+            <ac:spMk id="6" creationId="{27267216-01DE-41F7-88A2-E9164B52849C}"/>
+          </ac:spMkLst>
+        </pc:spChg>
+      </pc:sldChg>
+    </pc:docChg>
+  </pc:docChgLst>
+  <pc:docChgLst>
     <pc:chgData name="Gerth Stølting Brodal" userId="04ef4784-6591-4f86-a140-f5c3b108582a" providerId="ADAL" clId="{05A146E9-C4DA-4AB5-A111-FD148002D653}"/>
     <pc:docChg chg="custSel modSld">
       <pc:chgData name="Gerth Stølting Brodal" userId="04ef4784-6591-4f86-a140-f5c3b108582a" providerId="ADAL" clId="{05A146E9-C4DA-4AB5-A111-FD148002D653}" dt="2023-05-03T10:56:52.496" v="448" actId="20577"/>
@@ -523,7 +569,7 @@
           <a:p>
             <a:fld id="{FB1A172F-81D4-4DC4-9113-1DBD56EC3646}" type="datetimeFigureOut">
               <a:rPr lang="en-US" smtClean="0"/>
-              <a:t>5/3/2023</a:t>
+              <a:t>5/1/2024</a:t>
             </a:fld>
             <a:endParaRPr lang="en-US"/>
           </a:p>
@@ -878,6 +924,126 @@
 </p:notes>
 </file>
 
+<file path=ppt/notesSlides/notesSlide10.xml><?xml version="1.0" encoding="utf-8"?>
+<p:notes xmlns:a="http://schemas.openxmlformats.org/drawingml/2006/main" xmlns:r="http://schemas.openxmlformats.org/officeDocument/2006/relationships" xmlns:p="http://schemas.openxmlformats.org/presentationml/2006/main">
+  <p:cSld>
+    <p:spTree>
+      <p:nvGrpSpPr>
+        <p:cNvPr id="1" name=""/>
+        <p:cNvGrpSpPr/>
+        <p:nvPr/>
+      </p:nvGrpSpPr>
+      <p:grpSpPr>
+        <a:xfrm>
+          <a:off x="0" y="0"/>
+          <a:ext cx="0" cy="0"/>
+          <a:chOff x="0" y="0"/>
+          <a:chExt cx="0" cy="0"/>
+        </a:xfrm>
+      </p:grpSpPr>
+      <p:sp>
+        <p:nvSpPr>
+          <p:cNvPr id="2" name="Slide Image Placeholder 1"/>
+          <p:cNvSpPr>
+            <a:spLocks noGrp="1" noRot="1" noChangeAspect="1"/>
+          </p:cNvSpPr>
+          <p:nvPr>
+            <p:ph type="sldImg"/>
+          </p:nvPr>
+        </p:nvSpPr>
+        <p:spPr/>
+      </p:sp>
+      <p:sp>
+        <p:nvSpPr>
+          <p:cNvPr id="3" name="Notes Placeholder 2"/>
+          <p:cNvSpPr>
+            <a:spLocks noGrp="1"/>
+          </p:cNvSpPr>
+          <p:nvPr>
+            <p:ph type="body" idx="1"/>
+          </p:nvPr>
+        </p:nvSpPr>
+        <p:spPr/>
+        <p:txBody>
+          <a:bodyPr/>
+          <a:lstStyle/>
+          <a:p>
+            <a:r>
+              <a:rPr lang="en-US" dirty="0"/>
+              <a:t>Grid : top-row 2 buttons + </a:t>
+            </a:r>
+            <a:r>
+              <a:rPr lang="en-US" dirty="0" err="1"/>
+              <a:t>tkinter.Checkbutton</a:t>
+            </a:r>
+            <a:r>
+              <a:rPr lang="da-DK" dirty="0"/>
+              <a:t>, </a:t>
+            </a:r>
+            <a:r>
+              <a:rPr lang="da-DK" dirty="0" err="1"/>
+              <a:t>button-row</a:t>
+            </a:r>
+            <a:r>
+              <a:rPr lang="da-DK" dirty="0"/>
+              <a:t> </a:t>
+            </a:r>
+            <a:r>
+              <a:rPr lang="da-DK" dirty="0" err="1"/>
+              <a:t>canvas</a:t>
+            </a:r>
+            <a:r>
+              <a:rPr lang="da-DK" dirty="0"/>
+              <a:t> with </a:t>
+            </a:r>
+            <a:r>
+              <a:rPr lang="da-DK" dirty="0" err="1"/>
+              <a:t>columnspan</a:t>
+            </a:r>
+            <a:r>
+              <a:rPr lang="da-DK" dirty="0"/>
+              <a:t>=3</a:t>
+            </a:r>
+            <a:endParaRPr lang="en-US" dirty="0"/>
+          </a:p>
+        </p:txBody>
+      </p:sp>
+      <p:sp>
+        <p:nvSpPr>
+          <p:cNvPr id="4" name="Slide Number Placeholder 3"/>
+          <p:cNvSpPr>
+            <a:spLocks noGrp="1"/>
+          </p:cNvSpPr>
+          <p:nvPr>
+            <p:ph type="sldNum" sz="quarter" idx="5"/>
+          </p:nvPr>
+        </p:nvSpPr>
+        <p:spPr/>
+        <p:txBody>
+          <a:bodyPr/>
+          <a:lstStyle/>
+          <a:p>
+            <a:fld id="{CD563DD8-32AB-41BE-B1C6-8EAC45222ACE}" type="slidenum">
+              <a:rPr lang="en-US" smtClean="0"/>
+              <a:t>20</a:t>
+            </a:fld>
+            <a:endParaRPr lang="en-US"/>
+          </a:p>
+        </p:txBody>
+      </p:sp>
+    </p:spTree>
+    <p:extLst>
+      <p:ext uri="{BB962C8B-B14F-4D97-AF65-F5344CB8AC3E}">
+        <p14:creationId xmlns:p14="http://schemas.microsoft.com/office/powerpoint/2010/main" val="1574192565"/>
+      </p:ext>
+    </p:extLst>
+  </p:cSld>
+  <p:clrMapOvr>
+    <a:masterClrMapping/>
+  </p:clrMapOvr>
+</p:notes>
+</file>
+
 <file path=ppt/notesSlides/notesSlide2.xml><?xml version="1.0" encoding="utf-8"?>
 <p:notes xmlns:a="http://schemas.openxmlformats.org/drawingml/2006/main" xmlns:r="http://schemas.openxmlformats.org/officeDocument/2006/relationships" xmlns:p="http://schemas.openxmlformats.org/presentationml/2006/main">
   <p:cSld>
@@ -1144,28 +1310,7 @@
           <a:bodyPr/>
           <a:lstStyle/>
           <a:p>
-            <a:r>
-              <a:rPr lang="en-US" dirty="0"/>
-              <a:t>inversion of control</a:t>
-            </a:r>
-          </a:p>
-          <a:p>
-            <a:endParaRPr lang="en-US" dirty="0"/>
-          </a:p>
-          <a:p>
-            <a:r>
-              <a:rPr lang="en-US" dirty="0" err="1"/>
-              <a:t>mainloop</a:t>
-            </a:r>
-            <a:r>
-              <a:rPr lang="en-US" dirty="0"/>
-              <a:t>  # without this,</a:t>
-            </a:r>
-            <a:r>
-              <a:rPr lang="en-US" baseline="0" dirty="0"/>
-              <a:t> the window we show up but program terminate if run from shell</a:t>
-            </a:r>
-            <a:endParaRPr lang="en-US" dirty="0"/>
+            <a:endParaRPr lang="da-DK" dirty="0"/>
           </a:p>
         </p:txBody>
       </p:sp>
@@ -1176,7 +1321,7 @@
             <a:spLocks noGrp="1"/>
           </p:cNvSpPr>
           <p:nvPr>
-            <p:ph type="sldNum" sz="quarter" idx="10"/>
+            <p:ph type="sldNum" sz="quarter" idx="5"/>
           </p:nvPr>
         </p:nvSpPr>
         <p:spPr/>
@@ -1186,7 +1331,7 @@
           <a:p>
             <a:fld id="{CD563DD8-32AB-41BE-B1C6-8EAC45222ACE}" type="slidenum">
               <a:rPr lang="en-US" smtClean="0"/>
-              <a:t>9</a:t>
+              <a:t>8</a:t>
             </a:fld>
             <a:endParaRPr lang="en-US"/>
           </a:p>
@@ -1195,7 +1340,7 @@
     </p:spTree>
     <p:extLst>
       <p:ext uri="{BB962C8B-B14F-4D97-AF65-F5344CB8AC3E}">
-        <p14:creationId xmlns:p14="http://schemas.microsoft.com/office/powerpoint/2010/main" val="3750928809"/>
+        <p14:creationId xmlns:p14="http://schemas.microsoft.com/office/powerpoint/2010/main" val="3254200992"/>
       </p:ext>
     </p:extLst>
   </p:cSld>
@@ -1250,14 +1395,43 @@
           <a:lstStyle/>
           <a:p>
             <a:r>
-              <a:rPr lang="da-DK" dirty="0"/>
-              <a:t>(0,0) = upper </a:t>
-            </a:r>
-            <a:r>
-              <a:rPr lang="da-DK" dirty="0" err="1"/>
-              <a:t>left</a:t>
-            </a:r>
-            <a:endParaRPr lang="da-DK" dirty="0"/>
+              <a:rPr lang="en-US" dirty="0"/>
+              <a:t>inversion of control</a:t>
+            </a:r>
+          </a:p>
+          <a:p>
+            <a:endParaRPr lang="en-US" dirty="0"/>
+          </a:p>
+          <a:p>
+            <a:r>
+              <a:rPr lang="en-US" dirty="0" err="1"/>
+              <a:t>mainloop</a:t>
+            </a:r>
+            <a:r>
+              <a:rPr lang="en-US" dirty="0"/>
+              <a:t>  # without this,</a:t>
+            </a:r>
+            <a:r>
+              <a:rPr lang="en-US" baseline="0" dirty="0"/>
+              <a:t> the </a:t>
+            </a:r>
+            <a:r>
+              <a:rPr lang="en-US" baseline="0"/>
+              <a:t>window will </a:t>
+            </a:r>
+            <a:r>
+              <a:rPr lang="en-US" baseline="0" dirty="0"/>
+              <a:t>show up but </a:t>
+            </a:r>
+            <a:r>
+              <a:rPr lang="en-US" baseline="0"/>
+              <a:t>program terminates </a:t>
+            </a:r>
+            <a:r>
+              <a:rPr lang="en-US" baseline="0" dirty="0"/>
+              <a:t>if run from shell</a:t>
+            </a:r>
+            <a:endParaRPr lang="en-US" dirty="0"/>
           </a:p>
         </p:txBody>
       </p:sp>
@@ -1268,7 +1442,7 @@
             <a:spLocks noGrp="1"/>
           </p:cNvSpPr>
           <p:nvPr>
-            <p:ph type="sldNum" sz="quarter" idx="5"/>
+            <p:ph type="sldNum" sz="quarter" idx="10"/>
           </p:nvPr>
         </p:nvSpPr>
         <p:spPr/>
@@ -1278,7 +1452,7 @@
           <a:p>
             <a:fld id="{CD563DD8-32AB-41BE-B1C6-8EAC45222ACE}" type="slidenum">
               <a:rPr lang="en-US" smtClean="0"/>
-              <a:t>13</a:t>
+              <a:t>9</a:t>
             </a:fld>
             <a:endParaRPr lang="en-US"/>
           </a:p>
@@ -1287,7 +1461,7 @@
     </p:spTree>
     <p:extLst>
       <p:ext uri="{BB962C8B-B14F-4D97-AF65-F5344CB8AC3E}">
-        <p14:creationId xmlns:p14="http://schemas.microsoft.com/office/powerpoint/2010/main" val="4183965177"/>
+        <p14:creationId xmlns:p14="http://schemas.microsoft.com/office/powerpoint/2010/main" val="3750928809"/>
       </p:ext>
     </p:extLst>
   </p:cSld>
@@ -1342,171 +1516,14 @@
           <a:lstStyle/>
           <a:p>
             <a:r>
+              <a:rPr lang="da-DK" dirty="0"/>
+              <a:t>(0,0) = upper </a:t>
+            </a:r>
+            <a:r>
               <a:rPr lang="da-DK" dirty="0" err="1"/>
-              <a:t>Qt</a:t>
-            </a:r>
-            <a:r>
-              <a:rPr lang="da-DK" baseline="0" dirty="0"/>
-              <a:t> more </a:t>
-            </a:r>
-            <a:r>
-              <a:rPr lang="da-DK" baseline="0" dirty="0" err="1"/>
-              <a:t>modern</a:t>
-            </a:r>
-            <a:r>
-              <a:rPr lang="da-DK" baseline="0" dirty="0"/>
-              <a:t> </a:t>
-            </a:r>
-            <a:r>
-              <a:rPr lang="da-DK" baseline="0" dirty="0" err="1"/>
-              <a:t>framework</a:t>
-            </a:r>
-            <a:r>
-              <a:rPr lang="da-DK" baseline="0" dirty="0"/>
-              <a:t> (</a:t>
-            </a:r>
-            <a:r>
-              <a:rPr lang="da-DK" baseline="0" dirty="0" err="1"/>
-              <a:t>written</a:t>
-            </a:r>
-            <a:r>
-              <a:rPr lang="da-DK" baseline="0" dirty="0"/>
-              <a:t> in C++)</a:t>
-            </a:r>
-          </a:p>
-          <a:p>
-            <a:r>
-              <a:rPr lang="da-DK" baseline="0" dirty="0"/>
-              <a:t>Can </a:t>
-            </a:r>
-            <a:r>
-              <a:rPr lang="da-DK" baseline="0" dirty="0" err="1"/>
-              <a:t>use</a:t>
-            </a:r>
-            <a:r>
-              <a:rPr lang="da-DK" baseline="0" dirty="0"/>
-              <a:t> </a:t>
-            </a:r>
-            <a:r>
-              <a:rPr lang="da-DK" baseline="0" dirty="0" err="1"/>
-              <a:t>QtDesigner</a:t>
-            </a:r>
-            <a:r>
-              <a:rPr lang="da-DK" baseline="0" dirty="0"/>
-              <a:t> to design interfaces</a:t>
-            </a:r>
-          </a:p>
-          <a:p>
-            <a:endParaRPr lang="da-DK" baseline="0" dirty="0"/>
-          </a:p>
-          <a:p>
-            <a:r>
-              <a:rPr lang="da-DK" baseline="0" dirty="0" err="1"/>
-              <a:t>tkinter.messagebox.showinfo</a:t>
-            </a:r>
-            <a:r>
-              <a:rPr lang="da-DK" baseline="0" dirty="0"/>
-              <a:t>  </a:t>
-            </a:r>
-            <a:r>
-              <a:rPr lang="da-DK" baseline="0" dirty="0" err="1"/>
-              <a:t>requires</a:t>
-            </a:r>
-            <a:r>
-              <a:rPr lang="da-DK" baseline="0" dirty="0"/>
-              <a:t> ”import </a:t>
-            </a:r>
-            <a:r>
-              <a:rPr lang="da-DK" baseline="0" dirty="0" err="1"/>
-              <a:t>tkinter.messagebox</a:t>
-            </a:r>
-            <a:r>
-              <a:rPr lang="da-DK" baseline="0" dirty="0"/>
-              <a:t>”, </a:t>
-            </a:r>
-            <a:r>
-              <a:rPr lang="da-DK" baseline="0" dirty="0" err="1"/>
-              <a:t>other</a:t>
-            </a:r>
-            <a:r>
-              <a:rPr lang="da-DK" baseline="0" dirty="0"/>
-              <a:t> </a:t>
-            </a:r>
-            <a:r>
-              <a:rPr lang="da-DK" baseline="0" dirty="0" err="1"/>
-              <a:t>fails</a:t>
-            </a:r>
-            <a:r>
-              <a:rPr lang="da-DK" baseline="0" dirty="0"/>
-              <a:t> with ”</a:t>
-            </a:r>
-            <a:r>
-              <a:rPr lang="en-US" baseline="0" dirty="0"/>
-              <a:t>module '</a:t>
-            </a:r>
-            <a:r>
-              <a:rPr lang="en-US" baseline="0" dirty="0" err="1"/>
-              <a:t>tkinter</a:t>
-            </a:r>
-            <a:r>
-              <a:rPr lang="en-US" baseline="0" dirty="0"/>
-              <a:t>' has no attribute '</a:t>
-            </a:r>
-            <a:r>
-              <a:rPr lang="en-US" baseline="0" dirty="0" err="1"/>
-              <a:t>messagebox</a:t>
-            </a:r>
-            <a:r>
-              <a:rPr lang="en-US" baseline="0" dirty="0"/>
-              <a:t>’” since submodule</a:t>
-            </a:r>
-          </a:p>
-          <a:p>
-            <a:r>
-              <a:rPr lang="en-US" baseline="0" dirty="0"/>
-              <a:t>.</a:t>
-            </a:r>
-            <a:r>
-              <a:rPr lang="en-US" baseline="0" dirty="0" err="1"/>
-              <a:t>resizeable</a:t>
-            </a:r>
-            <a:r>
-              <a:rPr lang="en-US" baseline="0" dirty="0"/>
-              <a:t>(False, False) or .</a:t>
-            </a:r>
-            <a:r>
-              <a:rPr lang="en-US" baseline="0" dirty="0" err="1"/>
-              <a:t>resizeable</a:t>
-            </a:r>
-            <a:r>
-              <a:rPr lang="en-US" baseline="0" dirty="0"/>
-              <a:t>(0, 0) disables </a:t>
-            </a:r>
-            <a:r>
-              <a:rPr lang="en-US" baseline="0" dirty="0" err="1"/>
-              <a:t>resizeable</a:t>
-            </a:r>
-            <a:r>
-              <a:rPr lang="en-US" baseline="0" dirty="0"/>
-              <a:t> and “</a:t>
-            </a:r>
-            <a:r>
-              <a:rPr lang="en-US" baseline="0" dirty="0" err="1"/>
-              <a:t>fullscreen</a:t>
-            </a:r>
-            <a:r>
-              <a:rPr lang="en-US" baseline="0" dirty="0"/>
-              <a:t>” button on the window’s </a:t>
-            </a:r>
-            <a:r>
-              <a:rPr lang="en-US" baseline="0" dirty="0" err="1"/>
-              <a:t>topbar</a:t>
-            </a:r>
-            <a:r>
-              <a:rPr lang="en-US" baseline="0" dirty="0"/>
-              <a:t>.</a:t>
-            </a:r>
-            <a:endParaRPr lang="en-US" dirty="0"/>
+              <a:t>left</a:t>
+            </a:r>
+            <a:endParaRPr lang="da-DK" dirty="0"/>
           </a:p>
         </p:txBody>
       </p:sp>
@@ -1517,7 +1534,7 @@
             <a:spLocks noGrp="1"/>
           </p:cNvSpPr>
           <p:nvPr>
-            <p:ph type="sldNum" sz="quarter" idx="10"/>
+            <p:ph type="sldNum" sz="quarter" idx="5"/>
           </p:nvPr>
         </p:nvSpPr>
         <p:spPr/>
@@ -1527,7 +1544,7 @@
           <a:p>
             <a:fld id="{CD563DD8-32AB-41BE-B1C6-8EAC45222ACE}" type="slidenum">
               <a:rPr lang="en-US" smtClean="0"/>
-              <a:t>16</a:t>
+              <a:t>13</a:t>
             </a:fld>
             <a:endParaRPr lang="en-US"/>
           </a:p>
@@ -1536,7 +1553,7 @@
     </p:spTree>
     <p:extLst>
       <p:ext uri="{BB962C8B-B14F-4D97-AF65-F5344CB8AC3E}">
-        <p14:creationId xmlns:p14="http://schemas.microsoft.com/office/powerpoint/2010/main" val="2458497683"/>
+        <p14:creationId xmlns:p14="http://schemas.microsoft.com/office/powerpoint/2010/main" val="4183965177"/>
       </p:ext>
     </p:extLst>
   </p:cSld>
@@ -1591,18 +1608,171 @@
           <a:lstStyle/>
           <a:p>
             <a:r>
-              <a:rPr lang="en-US" dirty="0"/>
-              <a:t>Use </a:t>
-            </a:r>
-            <a:r>
-              <a:rPr lang="en-US" dirty="0" err="1"/>
-              <a:t>root.config</a:t>
-            </a:r>
-            <a:r>
-              <a:rPr lang="en-US" dirty="0"/>
-              <a:t> to show menu instead of .pack or .grid</a:t>
-            </a:r>
-            <a:endParaRPr lang="da-DK" dirty="0"/>
+              <a:rPr lang="da-DK" dirty="0" err="1"/>
+              <a:t>Qt</a:t>
+            </a:r>
+            <a:r>
+              <a:rPr lang="da-DK" baseline="0" dirty="0"/>
+              <a:t> more </a:t>
+            </a:r>
+            <a:r>
+              <a:rPr lang="da-DK" baseline="0" dirty="0" err="1"/>
+              <a:t>modern</a:t>
+            </a:r>
+            <a:r>
+              <a:rPr lang="da-DK" baseline="0" dirty="0"/>
+              <a:t> </a:t>
+            </a:r>
+            <a:r>
+              <a:rPr lang="da-DK" baseline="0" dirty="0" err="1"/>
+              <a:t>framework</a:t>
+            </a:r>
+            <a:r>
+              <a:rPr lang="da-DK" baseline="0" dirty="0"/>
+              <a:t> (</a:t>
+            </a:r>
+            <a:r>
+              <a:rPr lang="da-DK" baseline="0" dirty="0" err="1"/>
+              <a:t>written</a:t>
+            </a:r>
+            <a:r>
+              <a:rPr lang="da-DK" baseline="0" dirty="0"/>
+              <a:t> in C++)</a:t>
+            </a:r>
+          </a:p>
+          <a:p>
+            <a:r>
+              <a:rPr lang="da-DK" baseline="0" dirty="0"/>
+              <a:t>Can </a:t>
+            </a:r>
+            <a:r>
+              <a:rPr lang="da-DK" baseline="0" dirty="0" err="1"/>
+              <a:t>use</a:t>
+            </a:r>
+            <a:r>
+              <a:rPr lang="da-DK" baseline="0" dirty="0"/>
+              <a:t> </a:t>
+            </a:r>
+            <a:r>
+              <a:rPr lang="da-DK" baseline="0" dirty="0" err="1"/>
+              <a:t>QtDesigner</a:t>
+            </a:r>
+            <a:r>
+              <a:rPr lang="da-DK" baseline="0" dirty="0"/>
+              <a:t> to design interfaces</a:t>
+            </a:r>
+          </a:p>
+          <a:p>
+            <a:endParaRPr lang="da-DK" baseline="0" dirty="0"/>
+          </a:p>
+          <a:p>
+            <a:r>
+              <a:rPr lang="da-DK" baseline="0" dirty="0" err="1"/>
+              <a:t>tkinter.messagebox.showinfo</a:t>
+            </a:r>
+            <a:r>
+              <a:rPr lang="da-DK" baseline="0" dirty="0"/>
+              <a:t>  </a:t>
+            </a:r>
+            <a:r>
+              <a:rPr lang="da-DK" baseline="0" dirty="0" err="1"/>
+              <a:t>requires</a:t>
+            </a:r>
+            <a:r>
+              <a:rPr lang="da-DK" baseline="0" dirty="0"/>
+              <a:t> ”import </a:t>
+            </a:r>
+            <a:r>
+              <a:rPr lang="da-DK" baseline="0" dirty="0" err="1"/>
+              <a:t>tkinter.messagebox</a:t>
+            </a:r>
+            <a:r>
+              <a:rPr lang="da-DK" baseline="0" dirty="0"/>
+              <a:t>”, </a:t>
+            </a:r>
+            <a:r>
+              <a:rPr lang="da-DK" baseline="0" dirty="0" err="1"/>
+              <a:t>other</a:t>
+            </a:r>
+            <a:r>
+              <a:rPr lang="da-DK" baseline="0" dirty="0"/>
+              <a:t> </a:t>
+            </a:r>
+            <a:r>
+              <a:rPr lang="da-DK" baseline="0" dirty="0" err="1"/>
+              <a:t>fails</a:t>
+            </a:r>
+            <a:r>
+              <a:rPr lang="da-DK" baseline="0" dirty="0"/>
+              <a:t> with ”</a:t>
+            </a:r>
+            <a:r>
+              <a:rPr lang="en-US" baseline="0" dirty="0"/>
+              <a:t>module '</a:t>
+            </a:r>
+            <a:r>
+              <a:rPr lang="en-US" baseline="0" dirty="0" err="1"/>
+              <a:t>tkinter</a:t>
+            </a:r>
+            <a:r>
+              <a:rPr lang="en-US" baseline="0" dirty="0"/>
+              <a:t>' has no attribute '</a:t>
+            </a:r>
+            <a:r>
+              <a:rPr lang="en-US" baseline="0" dirty="0" err="1"/>
+              <a:t>messagebox</a:t>
+            </a:r>
+            <a:r>
+              <a:rPr lang="en-US" baseline="0" dirty="0"/>
+              <a:t>’” since submodule</a:t>
+            </a:r>
+          </a:p>
+          <a:p>
+            <a:r>
+              <a:rPr lang="en-US" baseline="0" dirty="0"/>
+              <a:t>.</a:t>
+            </a:r>
+            <a:r>
+              <a:rPr lang="en-US" baseline="0" dirty="0" err="1"/>
+              <a:t>resizeable</a:t>
+            </a:r>
+            <a:r>
+              <a:rPr lang="en-US" baseline="0" dirty="0"/>
+              <a:t>(False, False) or .</a:t>
+            </a:r>
+            <a:r>
+              <a:rPr lang="en-US" baseline="0" dirty="0" err="1"/>
+              <a:t>resizeable</a:t>
+            </a:r>
+            <a:r>
+              <a:rPr lang="en-US" baseline="0" dirty="0"/>
+              <a:t>(0, 0) disables </a:t>
+            </a:r>
+            <a:r>
+              <a:rPr lang="en-US" baseline="0" dirty="0" err="1"/>
+              <a:t>resizeable</a:t>
+            </a:r>
+            <a:r>
+              <a:rPr lang="en-US" baseline="0" dirty="0"/>
+              <a:t> and “</a:t>
+            </a:r>
+            <a:r>
+              <a:rPr lang="en-US" baseline="0" dirty="0" err="1"/>
+              <a:t>fullscreen</a:t>
+            </a:r>
+            <a:r>
+              <a:rPr lang="en-US" baseline="0" dirty="0"/>
+              <a:t>” button on the window’s </a:t>
+            </a:r>
+            <a:r>
+              <a:rPr lang="en-US" baseline="0" dirty="0" err="1"/>
+              <a:t>topbar</a:t>
+            </a:r>
+            <a:r>
+              <a:rPr lang="en-US" baseline="0" dirty="0"/>
+              <a:t>.</a:t>
+            </a:r>
+            <a:endParaRPr lang="en-US" dirty="0"/>
           </a:p>
         </p:txBody>
       </p:sp>
@@ -1613,7 +1783,7 @@
             <a:spLocks noGrp="1"/>
           </p:cNvSpPr>
           <p:nvPr>
-            <p:ph type="sldNum" sz="quarter" idx="5"/>
+            <p:ph type="sldNum" sz="quarter" idx="10"/>
           </p:nvPr>
         </p:nvSpPr>
         <p:spPr/>
@@ -1623,7 +1793,7 @@
           <a:p>
             <a:fld id="{CD563DD8-32AB-41BE-B1C6-8EAC45222ACE}" type="slidenum">
               <a:rPr lang="en-US" smtClean="0"/>
-              <a:t>17</a:t>
+              <a:t>16</a:t>
             </a:fld>
             <a:endParaRPr lang="en-US"/>
           </a:p>
@@ -1632,7 +1802,7 @@
     </p:spTree>
     <p:extLst>
       <p:ext uri="{BB962C8B-B14F-4D97-AF65-F5344CB8AC3E}">
-        <p14:creationId xmlns:p14="http://schemas.microsoft.com/office/powerpoint/2010/main" val="3658298418"/>
+        <p14:creationId xmlns:p14="http://schemas.microsoft.com/office/powerpoint/2010/main" val="2458497683"/>
       </p:ext>
     </p:extLst>
   </p:cSld>
@@ -1688,13 +1858,17 @@
           <a:p>
             <a:r>
               <a:rPr lang="en-US" dirty="0"/>
-              <a:t>Keys are bound to the root window, whereas mouse clicks are bound to the specific widget</a:t>
-            </a:r>
-            <a:r>
-              <a:rPr lang="en-US"/>
-              <a:t>(=canvas)</a:t>
-            </a:r>
-            <a:endParaRPr lang="en-US" dirty="0"/>
+              <a:t>Use </a:t>
+            </a:r>
+            <a:r>
+              <a:rPr lang="en-US" dirty="0" err="1"/>
+              <a:t>root.config</a:t>
+            </a:r>
+            <a:r>
+              <a:rPr lang="en-US" dirty="0"/>
+              <a:t> to show menu instead of .pack or .grid</a:t>
+            </a:r>
+            <a:endParaRPr lang="da-DK" dirty="0"/>
           </a:p>
         </p:txBody>
       </p:sp>
@@ -1705,7 +1879,7 @@
             <a:spLocks noGrp="1"/>
           </p:cNvSpPr>
           <p:nvPr>
-            <p:ph type="sldNum" sz="quarter" idx="10"/>
+            <p:ph type="sldNum" sz="quarter" idx="5"/>
           </p:nvPr>
         </p:nvSpPr>
         <p:spPr/>
@@ -1715,7 +1889,7 @@
           <a:p>
             <a:fld id="{CD563DD8-32AB-41BE-B1C6-8EAC45222ACE}" type="slidenum">
               <a:rPr lang="en-US" smtClean="0"/>
-              <a:t>18</a:t>
+              <a:t>17</a:t>
             </a:fld>
             <a:endParaRPr lang="en-US"/>
           </a:p>
@@ -1724,7 +1898,7 @@
     </p:spTree>
     <p:extLst>
       <p:ext uri="{BB962C8B-B14F-4D97-AF65-F5344CB8AC3E}">
-        <p14:creationId xmlns:p14="http://schemas.microsoft.com/office/powerpoint/2010/main" val="170041126"/>
+        <p14:creationId xmlns:p14="http://schemas.microsoft.com/office/powerpoint/2010/main" val="3658298418"/>
       </p:ext>
     </p:extLst>
   </p:cSld>
@@ -1780,39 +1954,11 @@
           <a:p>
             <a:r>
               <a:rPr lang="en-US" dirty="0"/>
-              <a:t>Grid : top-row 2 buttons + </a:t>
-            </a:r>
-            <a:r>
-              <a:rPr lang="en-US" dirty="0" err="1"/>
-              <a:t>tkinter.Checkbutton</a:t>
-            </a:r>
-            <a:r>
-              <a:rPr lang="da-DK" dirty="0"/>
-              <a:t>, </a:t>
-            </a:r>
-            <a:r>
-              <a:rPr lang="da-DK" dirty="0" err="1"/>
-              <a:t>button-row</a:t>
-            </a:r>
-            <a:r>
-              <a:rPr lang="da-DK" dirty="0"/>
-              <a:t> </a:t>
-            </a:r>
-            <a:r>
-              <a:rPr lang="da-DK" dirty="0" err="1"/>
-              <a:t>canvas</a:t>
-            </a:r>
-            <a:r>
-              <a:rPr lang="da-DK" dirty="0"/>
-              <a:t> with </a:t>
-            </a:r>
-            <a:r>
-              <a:rPr lang="da-DK" dirty="0" err="1"/>
-              <a:t>columnspan</a:t>
-            </a:r>
-            <a:r>
-              <a:rPr lang="da-DK" dirty="0"/>
-              <a:t>=3</a:t>
+              <a:t>Keys are bound to the root window, whereas mouse clicks are bound to the specific widget</a:t>
+            </a:r>
+            <a:r>
+              <a:rPr lang="en-US"/>
+              <a:t>(=canvas)</a:t>
             </a:r>
             <a:endParaRPr lang="en-US" dirty="0"/>
           </a:p>
@@ -1825,7 +1971,7 @@
             <a:spLocks noGrp="1"/>
           </p:cNvSpPr>
           <p:nvPr>
-            <p:ph type="sldNum" sz="quarter" idx="5"/>
+            <p:ph type="sldNum" sz="quarter" idx="10"/>
           </p:nvPr>
         </p:nvSpPr>
         <p:spPr/>
@@ -1835,7 +1981,7 @@
           <a:p>
             <a:fld id="{CD563DD8-32AB-41BE-B1C6-8EAC45222ACE}" type="slidenum">
               <a:rPr lang="en-US" smtClean="0"/>
-              <a:t>20</a:t>
+              <a:t>18</a:t>
             </a:fld>
             <a:endParaRPr lang="en-US"/>
           </a:p>
@@ -1844,7 +1990,7 @@
     </p:spTree>
     <p:extLst>
       <p:ext uri="{BB962C8B-B14F-4D97-AF65-F5344CB8AC3E}">
-        <p14:creationId xmlns:p14="http://schemas.microsoft.com/office/powerpoint/2010/main" val="1574192565"/>
+        <p14:creationId xmlns:p14="http://schemas.microsoft.com/office/powerpoint/2010/main" val="170041126"/>
       </p:ext>
     </p:extLst>
   </p:cSld>
@@ -1991,7 +2137,7 @@
           <a:p>
             <a:fld id="{0560A9CD-0304-4E0B-9E82-E7E0115DE05B}" type="datetimeFigureOut">
               <a:rPr lang="en-US" smtClean="0"/>
-              <a:t>5/3/2023</a:t>
+              <a:t>5/1/2024</a:t>
             </a:fld>
             <a:endParaRPr lang="en-US"/>
           </a:p>
@@ -2159,7 +2305,7 @@
           <a:p>
             <a:fld id="{0560A9CD-0304-4E0B-9E82-E7E0115DE05B}" type="datetimeFigureOut">
               <a:rPr lang="en-US" smtClean="0"/>
-              <a:t>5/3/2023</a:t>
+              <a:t>5/1/2024</a:t>
             </a:fld>
             <a:endParaRPr lang="en-US"/>
           </a:p>
@@ -2337,7 +2483,7 @@
           <a:p>
             <a:fld id="{0560A9CD-0304-4E0B-9E82-E7E0115DE05B}" type="datetimeFigureOut">
               <a:rPr lang="en-US" smtClean="0"/>
-              <a:t>5/3/2023</a:t>
+              <a:t>5/1/2024</a:t>
             </a:fld>
             <a:endParaRPr lang="en-US"/>
           </a:p>
@@ -2520,7 +2666,7 @@
           <a:p>
             <a:fld id="{0560A9CD-0304-4E0B-9E82-E7E0115DE05B}" type="datetimeFigureOut">
               <a:rPr lang="en-US" smtClean="0"/>
-              <a:t>5/3/2023</a:t>
+              <a:t>5/1/2024</a:t>
             </a:fld>
             <a:endParaRPr lang="en-US"/>
           </a:p>
@@ -2765,7 +2911,7 @@
           <a:p>
             <a:fld id="{0560A9CD-0304-4E0B-9E82-E7E0115DE05B}" type="datetimeFigureOut">
               <a:rPr lang="en-US" smtClean="0"/>
-              <a:t>5/3/2023</a:t>
+              <a:t>5/1/2024</a:t>
             </a:fld>
             <a:endParaRPr lang="en-US"/>
           </a:p>
@@ -2994,7 +3140,7 @@
           <a:p>
             <a:fld id="{0560A9CD-0304-4E0B-9E82-E7E0115DE05B}" type="datetimeFigureOut">
               <a:rPr lang="en-US" smtClean="0"/>
-              <a:t>5/3/2023</a:t>
+              <a:t>5/1/2024</a:t>
             </a:fld>
             <a:endParaRPr lang="en-US"/>
           </a:p>
@@ -3358,7 +3504,7 @@
           <a:p>
             <a:fld id="{0560A9CD-0304-4E0B-9E82-E7E0115DE05B}" type="datetimeFigureOut">
               <a:rPr lang="en-US" smtClean="0"/>
-              <a:t>5/3/2023</a:t>
+              <a:t>5/1/2024</a:t>
             </a:fld>
             <a:endParaRPr lang="en-US"/>
           </a:p>
@@ -3475,7 +3621,7 @@
           <a:p>
             <a:fld id="{0560A9CD-0304-4E0B-9E82-E7E0115DE05B}" type="datetimeFigureOut">
               <a:rPr lang="en-US" smtClean="0"/>
-              <a:t>5/3/2023</a:t>
+              <a:t>5/1/2024</a:t>
             </a:fld>
             <a:endParaRPr lang="en-US"/>
           </a:p>
@@ -3570,7 +3716,7 @@
           <a:p>
             <a:fld id="{0560A9CD-0304-4E0B-9E82-E7E0115DE05B}" type="datetimeFigureOut">
               <a:rPr lang="en-US" smtClean="0"/>
-              <a:t>5/3/2023</a:t>
+              <a:t>5/1/2024</a:t>
             </a:fld>
             <a:endParaRPr lang="en-US"/>
           </a:p>
@@ -3845,7 +3991,7 @@
           <a:p>
             <a:fld id="{0560A9CD-0304-4E0B-9E82-E7E0115DE05B}" type="datetimeFigureOut">
               <a:rPr lang="en-US" smtClean="0"/>
-              <a:t>5/3/2023</a:t>
+              <a:t>5/1/2024</a:t>
             </a:fld>
             <a:endParaRPr lang="en-US"/>
           </a:p>
@@ -4097,7 +4243,7 @@
           <a:p>
             <a:fld id="{0560A9CD-0304-4E0B-9E82-E7E0115DE05B}" type="datetimeFigureOut">
               <a:rPr lang="en-US" smtClean="0"/>
-              <a:t>5/3/2023</a:t>
+              <a:t>5/1/2024</a:t>
             </a:fld>
             <a:endParaRPr lang="en-US"/>
           </a:p>
@@ -4308,7 +4454,7 @@
           <a:p>
             <a:fld id="{0560A9CD-0304-4E0B-9E82-E7E0115DE05B}" type="datetimeFigureOut">
               <a:rPr lang="en-US" smtClean="0"/>
-              <a:t>5/3/2023</a:t>
+              <a:t>5/1/2024</a:t>
             </a:fld>
             <a:endParaRPr lang="en-US"/>
           </a:p>
@@ -14987,7 +15133,7 @@
                   <a:srgbClr val="C00000"/>
                 </a:solidFill>
               </a:rPr>
-              <a:t>windows manager</a:t>
+              <a:t>window manager</a:t>
             </a:r>
           </a:p>
           <a:p>
@@ -16196,7 +16342,7 @@
           <p:nvPr/>
         </p:nvPicPr>
         <p:blipFill>
-          <a:blip r:embed="rId2" cstate="print">
+          <a:blip r:embed="rId3" cstate="print">
             <a:extLst>
               <a:ext uri="{28A0092B-C50C-407E-A947-70E740481C1C}">
                 <a14:useLocalDpi xmlns:a14="http://schemas.microsoft.com/office/drawing/2010/main" val="0"/>
@@ -16416,16 +16562,43 @@
           </a:lstStyle>
           <a:p>
             <a:r>
-              <a:rPr lang="da-DK"/>
-              <a:t>Comes with Python</a:t>
+              <a:rPr lang="da-DK" dirty="0" err="1"/>
+              <a:t>Comes</a:t>
+            </a:r>
+            <a:r>
+              <a:rPr lang="da-DK" dirty="0"/>
+              <a:t> with Python</a:t>
             </a:r>
           </a:p>
           <a:p>
             <a:r>
-              <a:rPr lang="da-DK"/>
-              <a:t>Alternative PyQt</a:t>
-            </a:r>
-            <a:endParaRPr lang="da-DK" dirty="0"/>
+              <a:rPr lang="da-DK" dirty="0"/>
+              <a:t>Alternatives </a:t>
+            </a:r>
+            <a:r>
+              <a:rPr lang="da-DK" dirty="0" err="1"/>
+              <a:t>PySide</a:t>
+            </a:r>
+            <a:r>
+              <a:rPr lang="da-DK" dirty="0"/>
+              <a:t>, </a:t>
+            </a:r>
+            <a:r>
+              <a:rPr lang="da-DK" dirty="0" err="1"/>
+              <a:t>PyQt</a:t>
+            </a:r>
+            <a:r>
+              <a:rPr lang="da-DK" dirty="0"/>
+              <a:t>, </a:t>
+            </a:r>
+            <a:r>
+              <a:rPr lang="da-DK" dirty="0" err="1"/>
+              <a:t>Kivy</a:t>
+            </a:r>
+            <a:r>
+              <a:rPr lang="da-DK" dirty="0"/>
+              <a:t>, …</a:t>
+            </a:r>
           </a:p>
         </p:txBody>
       </p:sp>

</xml_diff>

<commit_message>
all-slides.pdf gui.pdf gui.pptx introduction.pdf introduction.pptx java.pdf java.pptx
</commit_message>
<xml_diff>
--- a/ipsa/slides/gui.pptx
+++ b/ipsa/slides/gui.pptx
@@ -283,10 +283,41 @@
   <pc:docChgLst>
     <pc:chgData name="Gerth Stølting Brodal" userId="04ef4784-6591-4f86-a140-f5c3b108582a" providerId="ADAL" clId="{939F7A13-0526-4A74-B066-813FB2B68789}"/>
     <pc:docChg chg="undo custSel modSld">
-      <pc:chgData name="Gerth Stølting Brodal" userId="04ef4784-6591-4f86-a140-f5c3b108582a" providerId="ADAL" clId="{939F7A13-0526-4A74-B066-813FB2B68789}" dt="2024-05-01T04:58:26.549" v="28" actId="20577"/>
+      <pc:chgData name="Gerth Stølting Brodal" userId="04ef4784-6591-4f86-a140-f5c3b108582a" providerId="ADAL" clId="{939F7A13-0526-4A74-B066-813FB2B68789}" dt="2024-05-01T08:30:24.581" v="34" actId="9405"/>
       <pc:docMkLst>
         <pc:docMk/>
       </pc:docMkLst>
+      <pc:sldChg chg="addSp delSp mod">
+        <pc:chgData name="Gerth Stølting Brodal" userId="04ef4784-6591-4f86-a140-f5c3b108582a" providerId="ADAL" clId="{939F7A13-0526-4A74-B066-813FB2B68789}" dt="2024-05-01T08:30:24.581" v="34" actId="9405"/>
+        <pc:sldMkLst>
+          <pc:docMk/>
+          <pc:sldMk cId="1194292255" sldId="464"/>
+        </pc:sldMkLst>
+        <pc:inkChg chg="add del">
+          <ac:chgData name="Gerth Stølting Brodal" userId="04ef4784-6591-4f86-a140-f5c3b108582a" providerId="ADAL" clId="{939F7A13-0526-4A74-B066-813FB2B68789}" dt="2024-05-01T08:30:24.581" v="34" actId="9405"/>
+          <ac:inkMkLst>
+            <pc:docMk/>
+            <pc:sldMk cId="1194292255" sldId="464"/>
+            <ac:inkMk id="4" creationId="{9B440802-0D1A-078D-A5CE-E6ADE98546F7}"/>
+          </ac:inkMkLst>
+        </pc:inkChg>
+        <pc:inkChg chg="add del">
+          <ac:chgData name="Gerth Stølting Brodal" userId="04ef4784-6591-4f86-a140-f5c3b108582a" providerId="ADAL" clId="{939F7A13-0526-4A74-B066-813FB2B68789}" dt="2024-05-01T08:30:24.377" v="33" actId="9405"/>
+          <ac:inkMkLst>
+            <pc:docMk/>
+            <pc:sldMk cId="1194292255" sldId="464"/>
+            <ac:inkMk id="5" creationId="{5AFE3D03-8F06-A967-074F-8AC14AA6F183}"/>
+          </ac:inkMkLst>
+        </pc:inkChg>
+        <pc:cxnChg chg="add del">
+          <ac:chgData name="Gerth Stølting Brodal" userId="04ef4784-6591-4f86-a140-f5c3b108582a" providerId="ADAL" clId="{939F7A13-0526-4A74-B066-813FB2B68789}" dt="2024-05-01T08:30:24.172" v="32" actId="11529"/>
+          <ac:cxnSpMkLst>
+            <pc:docMk/>
+            <pc:sldMk cId="1194292255" sldId="464"/>
+            <ac:cxnSpMk id="7" creationId="{58C4E811-207A-6A8B-2BDA-FD46535331BB}"/>
+          </ac:cxnSpMkLst>
+        </pc:cxnChg>
+      </pc:sldChg>
       <pc:sldChg chg="modSp mod">
         <pc:chgData name="Gerth Stølting Brodal" userId="04ef4784-6591-4f86-a140-f5c3b108582a" providerId="ADAL" clId="{939F7A13-0526-4A74-B066-813FB2B68789}" dt="2024-05-01T04:41:46.751" v="2" actId="20577"/>
         <pc:sldMkLst>

</xml_diff>

<commit_message>
all-slides.pdf clustering.pdf clustering.pptx code.zip gui.pdf gui.pptx java.pdf java.pptx pandas.pdf pandas.pptx
</commit_message>
<xml_diff>
--- a/ipsa/slides/gui.pptx
+++ b/ipsa/slides/gui.pptx
@@ -10,11 +10,11 @@
   <p:sldIdLst>
     <p:sldId id="464" r:id="rId2"/>
     <p:sldId id="719" r:id="rId3"/>
-    <p:sldId id="720" r:id="rId4"/>
+    <p:sldId id="724" r:id="rId4"/>
     <p:sldId id="721" r:id="rId5"/>
-    <p:sldId id="722" r:id="rId6"/>
-    <p:sldId id="723" r:id="rId7"/>
-    <p:sldId id="724" r:id="rId8"/>
+    <p:sldId id="720" r:id="rId6"/>
+    <p:sldId id="722" r:id="rId7"/>
+    <p:sldId id="723" r:id="rId8"/>
     <p:sldId id="726" r:id="rId9"/>
     <p:sldId id="725" r:id="rId10"/>
     <p:sldId id="731" r:id="rId11"/>
@@ -149,22 +149,6 @@
           <pc:docMk/>
           <pc:sldMk cId="744276305" sldId="719"/>
         </pc:sldMkLst>
-        <pc:graphicFrameChg chg="mod modGraphic">
-          <ac:chgData name="Gerth Stølting Brodal" userId="04ef4784-6591-4f86-a140-f5c3b108582a" providerId="ADAL" clId="{C7D73353-E570-4DE2-A8C9-171C068B51FD}" dt="2022-05-04T05:09:05.198" v="13" actId="1076"/>
-          <ac:graphicFrameMkLst>
-            <pc:docMk/>
-            <pc:sldMk cId="744276305" sldId="719"/>
-            <ac:graphicFrameMk id="4" creationId="{00000000-0000-0000-0000-000000000000}"/>
-          </ac:graphicFrameMkLst>
-        </pc:graphicFrameChg>
-        <pc:graphicFrameChg chg="mod modGraphic">
-          <ac:chgData name="Gerth Stølting Brodal" userId="04ef4784-6591-4f86-a140-f5c3b108582a" providerId="ADAL" clId="{C7D73353-E570-4DE2-A8C9-171C068B51FD}" dt="2022-05-04T05:09:05.198" v="13" actId="1076"/>
-          <ac:graphicFrameMkLst>
-            <pc:docMk/>
-            <pc:sldMk cId="744276305" sldId="719"/>
-            <ac:graphicFrameMk id="5" creationId="{00000000-0000-0000-0000-000000000000}"/>
-          </ac:graphicFrameMkLst>
-        </pc:graphicFrameChg>
       </pc:sldChg>
       <pc:sldChg chg="modSp mod modNotesTx">
         <pc:chgData name="Gerth Stølting Brodal" userId="04ef4784-6591-4f86-a140-f5c3b108582a" providerId="ADAL" clId="{C7D73353-E570-4DE2-A8C9-171C068B51FD}" dt="2022-05-04T09:21:07.560" v="59" actId="6549"/>
@@ -172,14 +156,6 @@
           <pc:docMk/>
           <pc:sldMk cId="9140677" sldId="723"/>
         </pc:sldMkLst>
-        <pc:spChg chg="mod">
-          <ac:chgData name="Gerth Stølting Brodal" userId="04ef4784-6591-4f86-a140-f5c3b108582a" providerId="ADAL" clId="{C7D73353-E570-4DE2-A8C9-171C068B51FD}" dt="2022-05-04T09:20:01.725" v="54" actId="20577"/>
-          <ac:spMkLst>
-            <pc:docMk/>
-            <pc:sldMk cId="9140677" sldId="723"/>
-            <ac:spMk id="3" creationId="{00000000-0000-0000-0000-000000000000}"/>
-          </ac:spMkLst>
-        </pc:spChg>
       </pc:sldChg>
       <pc:sldChg chg="addSp modSp add del mod">
         <pc:chgData name="Gerth Stølting Brodal" userId="04ef4784-6591-4f86-a140-f5c3b108582a" providerId="ADAL" clId="{C7D73353-E570-4DE2-A8C9-171C068B51FD}" dt="2022-05-04T05:16:24.942" v="17" actId="1036"/>
@@ -187,14 +163,6 @@
           <pc:docMk/>
           <pc:sldMk cId="3232636054" sldId="724"/>
         </pc:sldMkLst>
-        <pc:picChg chg="add mod">
-          <ac:chgData name="Gerth Stølting Brodal" userId="04ef4784-6591-4f86-a140-f5c3b108582a" providerId="ADAL" clId="{C7D73353-E570-4DE2-A8C9-171C068B51FD}" dt="2022-05-04T05:16:24.942" v="17" actId="1036"/>
-          <ac:picMkLst>
-            <pc:docMk/>
-            <pc:sldMk cId="3232636054" sldId="724"/>
-            <ac:picMk id="3" creationId="{19C8794E-A018-4433-B6EB-3B14B3ABBA1D}"/>
-          </ac:picMkLst>
-        </pc:picChg>
       </pc:sldChg>
       <pc:sldChg chg="addSp modSp mod">
         <pc:chgData name="Gerth Stølting Brodal" userId="04ef4784-6591-4f86-a140-f5c3b108582a" providerId="ADAL" clId="{C7D73353-E570-4DE2-A8C9-171C068B51FD}" dt="2022-05-04T09:24:28.894" v="129" actId="1076"/>
@@ -202,14 +170,6 @@
           <pc:docMk/>
           <pc:sldMk cId="3483016115" sldId="726"/>
         </pc:sldMkLst>
-        <pc:spChg chg="add mod">
-          <ac:chgData name="Gerth Stølting Brodal" userId="04ef4784-6591-4f86-a140-f5c3b108582a" providerId="ADAL" clId="{C7D73353-E570-4DE2-A8C9-171C068B51FD}" dt="2022-05-04T09:24:28.894" v="129" actId="1076"/>
-          <ac:spMkLst>
-            <pc:docMk/>
-            <pc:sldMk cId="3483016115" sldId="726"/>
-            <ac:spMk id="6" creationId="{27267216-01DE-41F7-88A2-E9164B52849C}"/>
-          </ac:spMkLst>
-        </pc:spChg>
       </pc:sldChg>
       <pc:sldChg chg="modNotesTx">
         <pc:chgData name="Gerth Stølting Brodal" userId="04ef4784-6591-4f86-a140-f5c3b108582a" providerId="ADAL" clId="{C7D73353-E570-4DE2-A8C9-171C068B51FD}" dt="2022-05-04T06:10:49.594" v="37" actId="20577"/>
@@ -231,14 +191,6 @@
           <pc:docMk/>
           <pc:sldMk cId="3428786955" sldId="733"/>
         </pc:sldMkLst>
-        <pc:graphicFrameChg chg="modGraphic">
-          <ac:chgData name="Gerth Stølting Brodal" userId="04ef4784-6591-4f86-a140-f5c3b108582a" providerId="ADAL" clId="{C7D73353-E570-4DE2-A8C9-171C068B51FD}" dt="2022-05-04T09:44:32.628" v="266" actId="20577"/>
-          <ac:graphicFrameMkLst>
-            <pc:docMk/>
-            <pc:sldMk cId="3428786955" sldId="733"/>
-            <ac:graphicFrameMk id="4" creationId="{00000000-0000-0000-0000-000000000000}"/>
-          </ac:graphicFrameMkLst>
-        </pc:graphicFrameChg>
       </pc:sldChg>
       <pc:sldChg chg="modSp mod">
         <pc:chgData name="Gerth Stølting Brodal" userId="04ef4784-6591-4f86-a140-f5c3b108582a" providerId="ADAL" clId="{C7D73353-E570-4DE2-A8C9-171C068B51FD}" dt="2022-05-04T10:11:42.038" v="268" actId="20577"/>
@@ -246,14 +198,6 @@
           <pc:docMk/>
           <pc:sldMk cId="3279576340" sldId="737"/>
         </pc:sldMkLst>
-        <pc:graphicFrameChg chg="modGraphic">
-          <ac:chgData name="Gerth Stølting Brodal" userId="04ef4784-6591-4f86-a140-f5c3b108582a" providerId="ADAL" clId="{C7D73353-E570-4DE2-A8C9-171C068B51FD}" dt="2022-05-04T10:11:42.038" v="268" actId="20577"/>
-          <ac:graphicFrameMkLst>
-            <pc:docMk/>
-            <pc:sldMk cId="3279576340" sldId="737"/>
-            <ac:graphicFrameMk id="4" creationId="{00000000-0000-0000-0000-000000000000}"/>
-          </ac:graphicFrameMkLst>
-        </pc:graphicFrameChg>
       </pc:sldChg>
       <pc:sldChg chg="addSp delSp modSp new del mod">
         <pc:chgData name="Gerth Stølting Brodal" userId="04ef4784-6591-4f86-a140-f5c3b108582a" providerId="ADAL" clId="{C7D73353-E570-4DE2-A8C9-171C068B51FD}" dt="2022-05-04T09:24:37.470" v="130" actId="47"/>
@@ -261,22 +205,6 @@
           <pc:docMk/>
           <pc:sldMk cId="2712065534" sldId="738"/>
         </pc:sldMkLst>
-        <pc:spChg chg="del mod">
-          <ac:chgData name="Gerth Stølting Brodal" userId="04ef4784-6591-4f86-a140-f5c3b108582a" providerId="ADAL" clId="{C7D73353-E570-4DE2-A8C9-171C068B51FD}" dt="2022-05-04T09:24:11.507" v="121" actId="21"/>
-          <ac:spMkLst>
-            <pc:docMk/>
-            <pc:sldMk cId="2712065534" sldId="738"/>
-            <ac:spMk id="3" creationId="{78A68A59-095A-4501-87B9-7AAF78C04AF5}"/>
-          </ac:spMkLst>
-        </pc:spChg>
-        <pc:spChg chg="add mod">
-          <ac:chgData name="Gerth Stølting Brodal" userId="04ef4784-6591-4f86-a140-f5c3b108582a" providerId="ADAL" clId="{C7D73353-E570-4DE2-A8C9-171C068B51FD}" dt="2022-05-04T09:24:11.507" v="121" actId="21"/>
-          <ac:spMkLst>
-            <pc:docMk/>
-            <pc:sldMk cId="2712065534" sldId="738"/>
-            <ac:spMk id="5" creationId="{7ECEC7A0-1521-43C7-884C-785DEFB8ED28}"/>
-          </ac:spMkLst>
-        </pc:spChg>
       </pc:sldChg>
     </pc:docChg>
   </pc:docChgLst>
@@ -293,30 +221,6 @@
           <pc:docMk/>
           <pc:sldMk cId="1194292255" sldId="464"/>
         </pc:sldMkLst>
-        <pc:inkChg chg="add del">
-          <ac:chgData name="Gerth Stølting Brodal" userId="04ef4784-6591-4f86-a140-f5c3b108582a" providerId="ADAL" clId="{939F7A13-0526-4A74-B066-813FB2B68789}" dt="2024-05-01T08:30:24.581" v="34" actId="9405"/>
-          <ac:inkMkLst>
-            <pc:docMk/>
-            <pc:sldMk cId="1194292255" sldId="464"/>
-            <ac:inkMk id="4" creationId="{9B440802-0D1A-078D-A5CE-E6ADE98546F7}"/>
-          </ac:inkMkLst>
-        </pc:inkChg>
-        <pc:inkChg chg="add del">
-          <ac:chgData name="Gerth Stølting Brodal" userId="04ef4784-6591-4f86-a140-f5c3b108582a" providerId="ADAL" clId="{939F7A13-0526-4A74-B066-813FB2B68789}" dt="2024-05-01T08:30:24.377" v="33" actId="9405"/>
-          <ac:inkMkLst>
-            <pc:docMk/>
-            <pc:sldMk cId="1194292255" sldId="464"/>
-            <ac:inkMk id="5" creationId="{5AFE3D03-8F06-A967-074F-8AC14AA6F183}"/>
-          </ac:inkMkLst>
-        </pc:inkChg>
-        <pc:cxnChg chg="add del">
-          <ac:chgData name="Gerth Stølting Brodal" userId="04ef4784-6591-4f86-a140-f5c3b108582a" providerId="ADAL" clId="{939F7A13-0526-4A74-B066-813FB2B68789}" dt="2024-05-01T08:30:24.172" v="32" actId="11529"/>
-          <ac:cxnSpMkLst>
-            <pc:docMk/>
-            <pc:sldMk cId="1194292255" sldId="464"/>
-            <ac:cxnSpMk id="7" creationId="{58C4E811-207A-6A8B-2BDA-FD46535331BB}"/>
-          </ac:cxnSpMkLst>
-        </pc:cxnChg>
       </pc:sldChg>
       <pc:sldChg chg="modSp mod">
         <pc:chgData name="Gerth Stølting Brodal" userId="04ef4784-6591-4f86-a140-f5c3b108582a" providerId="ADAL" clId="{939F7A13-0526-4A74-B066-813FB2B68789}" dt="2024-05-01T04:41:46.751" v="2" actId="20577"/>
@@ -324,14 +228,6 @@
           <pc:docMk/>
           <pc:sldMk cId="3472606578" sldId="720"/>
         </pc:sldMkLst>
-        <pc:spChg chg="mod">
-          <ac:chgData name="Gerth Stølting Brodal" userId="04ef4784-6591-4f86-a140-f5c3b108582a" providerId="ADAL" clId="{939F7A13-0526-4A74-B066-813FB2B68789}" dt="2024-05-01T04:41:46.751" v="2" actId="20577"/>
-          <ac:spMkLst>
-            <pc:docMk/>
-            <pc:sldMk cId="3472606578" sldId="720"/>
-            <ac:spMk id="3" creationId="{00000000-0000-0000-0000-000000000000}"/>
-          </ac:spMkLst>
-        </pc:spChg>
       </pc:sldChg>
       <pc:sldChg chg="modNotesTx">
         <pc:chgData name="Gerth Stølting Brodal" userId="04ef4784-6591-4f86-a140-f5c3b108582a" providerId="ADAL" clId="{939F7A13-0526-4A74-B066-813FB2B68789}" dt="2024-05-01T04:58:26.549" v="28" actId="20577"/>
@@ -346,14 +242,6 @@
           <pc:docMk/>
           <pc:sldMk cId="3483016115" sldId="726"/>
         </pc:sldMkLst>
-        <pc:spChg chg="mod">
-          <ac:chgData name="Gerth Stølting Brodal" userId="04ef4784-6591-4f86-a140-f5c3b108582a" providerId="ADAL" clId="{939F7A13-0526-4A74-B066-813FB2B68789}" dt="2024-05-01T04:50:07.679" v="23" actId="5793"/>
-          <ac:spMkLst>
-            <pc:docMk/>
-            <pc:sldMk cId="3483016115" sldId="726"/>
-            <ac:spMk id="6" creationId="{27267216-01DE-41F7-88A2-E9164B52849C}"/>
-          </ac:spMkLst>
-        </pc:spChg>
       </pc:sldChg>
     </pc:docChg>
   </pc:docChgLst>
@@ -370,14 +258,6 @@
           <pc:docMk/>
           <pc:sldMk cId="744276305" sldId="719"/>
         </pc:sldMkLst>
-        <pc:graphicFrameChg chg="modGraphic">
-          <ac:chgData name="Gerth Stølting Brodal" userId="04ef4784-6591-4f86-a140-f5c3b108582a" providerId="ADAL" clId="{05A146E9-C4DA-4AB5-A111-FD148002D653}" dt="2023-05-03T09:05:07.882" v="58" actId="313"/>
-          <ac:graphicFrameMkLst>
-            <pc:docMk/>
-            <pc:sldMk cId="744276305" sldId="719"/>
-            <ac:graphicFrameMk id="4" creationId="{00000000-0000-0000-0000-000000000000}"/>
-          </ac:graphicFrameMkLst>
-        </pc:graphicFrameChg>
       </pc:sldChg>
       <pc:sldChg chg="modSp mod">
         <pc:chgData name="Gerth Stølting Brodal" userId="04ef4784-6591-4f86-a140-f5c3b108582a" providerId="ADAL" clId="{05A146E9-C4DA-4AB5-A111-FD148002D653}" dt="2023-05-03T09:05:39.010" v="74" actId="313"/>
@@ -385,14 +265,6 @@
           <pc:docMk/>
           <pc:sldMk cId="1890479042" sldId="725"/>
         </pc:sldMkLst>
-        <pc:graphicFrameChg chg="modGraphic">
-          <ac:chgData name="Gerth Stølting Brodal" userId="04ef4784-6591-4f86-a140-f5c3b108582a" providerId="ADAL" clId="{05A146E9-C4DA-4AB5-A111-FD148002D653}" dt="2023-05-03T09:05:39.010" v="74" actId="313"/>
-          <ac:graphicFrameMkLst>
-            <pc:docMk/>
-            <pc:sldMk cId="1890479042" sldId="725"/>
-            <ac:graphicFrameMk id="6" creationId="{00000000-0000-0000-0000-000000000000}"/>
-          </ac:graphicFrameMkLst>
-        </pc:graphicFrameChg>
       </pc:sldChg>
       <pc:sldChg chg="modSp mod">
         <pc:chgData name="Gerth Stølting Brodal" userId="04ef4784-6591-4f86-a140-f5c3b108582a" providerId="ADAL" clId="{05A146E9-C4DA-4AB5-A111-FD148002D653}" dt="2023-05-03T09:05:54.450" v="100" actId="313"/>
@@ -400,14 +272,6 @@
           <pc:docMk/>
           <pc:sldMk cId="591020403" sldId="728"/>
         </pc:sldMkLst>
-        <pc:graphicFrameChg chg="modGraphic">
-          <ac:chgData name="Gerth Stølting Brodal" userId="04ef4784-6591-4f86-a140-f5c3b108582a" providerId="ADAL" clId="{05A146E9-C4DA-4AB5-A111-FD148002D653}" dt="2023-05-03T09:05:54.450" v="100" actId="313"/>
-          <ac:graphicFrameMkLst>
-            <pc:docMk/>
-            <pc:sldMk cId="591020403" sldId="728"/>
-            <ac:graphicFrameMk id="4" creationId="{00000000-0000-0000-0000-000000000000}"/>
-          </ac:graphicFrameMkLst>
-        </pc:graphicFrameChg>
       </pc:sldChg>
       <pc:sldChg chg="modSp mod">
         <pc:chgData name="Gerth Stølting Brodal" userId="04ef4784-6591-4f86-a140-f5c3b108582a" providerId="ADAL" clId="{05A146E9-C4DA-4AB5-A111-FD148002D653}" dt="2023-05-03T09:05:49.855" v="92" actId="313"/>
@@ -415,14 +279,6 @@
           <pc:docMk/>
           <pc:sldMk cId="1631747392" sldId="729"/>
         </pc:sldMkLst>
-        <pc:graphicFrameChg chg="modGraphic">
-          <ac:chgData name="Gerth Stølting Brodal" userId="04ef4784-6591-4f86-a140-f5c3b108582a" providerId="ADAL" clId="{05A146E9-C4DA-4AB5-A111-FD148002D653}" dt="2023-05-03T09:05:49.855" v="92" actId="313"/>
-          <ac:graphicFrameMkLst>
-            <pc:docMk/>
-            <pc:sldMk cId="1631747392" sldId="729"/>
-            <ac:graphicFrameMk id="4" creationId="{00000000-0000-0000-0000-000000000000}"/>
-          </ac:graphicFrameMkLst>
-        </pc:graphicFrameChg>
       </pc:sldChg>
       <pc:sldChg chg="modSp mod">
         <pc:chgData name="Gerth Stølting Brodal" userId="04ef4784-6591-4f86-a140-f5c3b108582a" providerId="ADAL" clId="{05A146E9-C4DA-4AB5-A111-FD148002D653}" dt="2023-05-03T09:05:52.501" v="96" actId="313"/>
@@ -430,14 +286,6 @@
           <pc:docMk/>
           <pc:sldMk cId="3591674602" sldId="730"/>
         </pc:sldMkLst>
-        <pc:graphicFrameChg chg="modGraphic">
-          <ac:chgData name="Gerth Stølting Brodal" userId="04ef4784-6591-4f86-a140-f5c3b108582a" providerId="ADAL" clId="{05A146E9-C4DA-4AB5-A111-FD148002D653}" dt="2023-05-03T09:05:52.501" v="96" actId="313"/>
-          <ac:graphicFrameMkLst>
-            <pc:docMk/>
-            <pc:sldMk cId="3591674602" sldId="730"/>
-            <ac:graphicFrameMk id="5" creationId="{00000000-0000-0000-0000-000000000000}"/>
-          </ac:graphicFrameMkLst>
-        </pc:graphicFrameChg>
       </pc:sldChg>
       <pc:sldChg chg="modSp mod">
         <pc:chgData name="Gerth Stølting Brodal" userId="04ef4784-6591-4f86-a140-f5c3b108582a" providerId="ADAL" clId="{05A146E9-C4DA-4AB5-A111-FD148002D653}" dt="2023-05-03T09:05:43.619" v="82" actId="313"/>
@@ -445,14 +293,6 @@
           <pc:docMk/>
           <pc:sldMk cId="998947821" sldId="731"/>
         </pc:sldMkLst>
-        <pc:graphicFrameChg chg="modGraphic">
-          <ac:chgData name="Gerth Stølting Brodal" userId="04ef4784-6591-4f86-a140-f5c3b108582a" providerId="ADAL" clId="{05A146E9-C4DA-4AB5-A111-FD148002D653}" dt="2023-05-03T09:05:43.619" v="82" actId="313"/>
-          <ac:graphicFrameMkLst>
-            <pc:docMk/>
-            <pc:sldMk cId="998947821" sldId="731"/>
-            <ac:graphicFrameMk id="6" creationId="{00000000-0000-0000-0000-000000000000}"/>
-          </ac:graphicFrameMkLst>
-        </pc:graphicFrameChg>
       </pc:sldChg>
       <pc:sldChg chg="modSp mod">
         <pc:chgData name="Gerth Stølting Brodal" userId="04ef4784-6591-4f86-a140-f5c3b108582a" providerId="ADAL" clId="{05A146E9-C4DA-4AB5-A111-FD148002D653}" dt="2023-05-03T09:05:47.028" v="88" actId="313"/>
@@ -460,14 +300,6 @@
           <pc:docMk/>
           <pc:sldMk cId="3170264930" sldId="732"/>
         </pc:sldMkLst>
-        <pc:graphicFrameChg chg="modGraphic">
-          <ac:chgData name="Gerth Stølting Brodal" userId="04ef4784-6591-4f86-a140-f5c3b108582a" providerId="ADAL" clId="{05A146E9-C4DA-4AB5-A111-FD148002D653}" dt="2023-05-03T09:05:47.028" v="88" actId="313"/>
-          <ac:graphicFrameMkLst>
-            <pc:docMk/>
-            <pc:sldMk cId="3170264930" sldId="732"/>
-            <ac:graphicFrameMk id="4" creationId="{00000000-0000-0000-0000-000000000000}"/>
-          </ac:graphicFrameMkLst>
-        </pc:graphicFrameChg>
       </pc:sldChg>
       <pc:sldChg chg="modSp mod">
         <pc:chgData name="Gerth Stølting Brodal" userId="04ef4784-6591-4f86-a140-f5c3b108582a" providerId="ADAL" clId="{05A146E9-C4DA-4AB5-A111-FD148002D653}" dt="2023-05-03T10:20:36.269" v="190" actId="207"/>
@@ -475,14 +307,6 @@
           <pc:docMk/>
           <pc:sldMk cId="3428786955" sldId="733"/>
         </pc:sldMkLst>
-        <pc:graphicFrameChg chg="modGraphic">
-          <ac:chgData name="Gerth Stølting Brodal" userId="04ef4784-6591-4f86-a140-f5c3b108582a" providerId="ADAL" clId="{05A146E9-C4DA-4AB5-A111-FD148002D653}" dt="2023-05-03T10:20:36.269" v="190" actId="207"/>
-          <ac:graphicFrameMkLst>
-            <pc:docMk/>
-            <pc:sldMk cId="3428786955" sldId="733"/>
-            <ac:graphicFrameMk id="4" creationId="{00000000-0000-0000-0000-000000000000}"/>
-          </ac:graphicFrameMkLst>
-        </pc:graphicFrameChg>
       </pc:sldChg>
       <pc:sldChg chg="modNotesTx">
         <pc:chgData name="Gerth Stølting Brodal" userId="04ef4784-6591-4f86-a140-f5c3b108582a" providerId="ADAL" clId="{05A146E9-C4DA-4AB5-A111-FD148002D653}" dt="2023-05-03T10:56:52.496" v="448" actId="20577"/>
@@ -497,20 +321,72 @@
           <pc:docMk/>
           <pc:sldMk cId="1276335403" sldId="735"/>
         </pc:sldMkLst>
-        <pc:graphicFrameChg chg="modGraphic">
-          <ac:chgData name="Gerth Stølting Brodal" userId="04ef4784-6591-4f86-a140-f5c3b108582a" providerId="ADAL" clId="{05A146E9-C4DA-4AB5-A111-FD148002D653}" dt="2023-05-03T09:06:21.674" v="128" actId="313"/>
-          <ac:graphicFrameMkLst>
-            <pc:docMk/>
-            <pc:sldMk cId="1276335403" sldId="735"/>
-            <ac:graphicFrameMk id="4" creationId="{00000000-0000-0000-0000-000000000000}"/>
-          </ac:graphicFrameMkLst>
-        </pc:graphicFrameChg>
       </pc:sldChg>
       <pc:sldChg chg="modNotesTx">
         <pc:chgData name="Gerth Stølting Brodal" userId="04ef4784-6591-4f86-a140-f5c3b108582a" providerId="ADAL" clId="{05A146E9-C4DA-4AB5-A111-FD148002D653}" dt="2023-05-03T10:50:01.355" v="343" actId="20577"/>
         <pc:sldMkLst>
           <pc:docMk/>
           <pc:sldMk cId="3023226840" sldId="736"/>
+        </pc:sldMkLst>
+      </pc:sldChg>
+    </pc:docChg>
+  </pc:docChgLst>
+  <pc:docChgLst>
+    <pc:chgData name="Gerth Stølting Brodal" userId="04ef4784-6591-4f86-a140-f5c3b108582a" providerId="ADAL" clId="{2757BA76-BACE-4DC2-9A33-8497ADB6AF33}"/>
+    <pc:docChg chg="modSld sldOrd">
+      <pc:chgData name="Gerth Stølting Brodal" userId="04ef4784-6591-4f86-a140-f5c3b108582a" providerId="ADAL" clId="{2757BA76-BACE-4DC2-9A33-8497ADB6AF33}" dt="2025-04-26T16:07:46.951" v="34" actId="14100"/>
+      <pc:docMkLst>
+        <pc:docMk/>
+      </pc:docMkLst>
+      <pc:sldChg chg="modNotesTx">
+        <pc:chgData name="Gerth Stølting Brodal" userId="04ef4784-6591-4f86-a140-f5c3b108582a" providerId="ADAL" clId="{2757BA76-BACE-4DC2-9A33-8497ADB6AF33}" dt="2025-04-26T16:03:04.538" v="31" actId="20577"/>
+        <pc:sldMkLst>
+          <pc:docMk/>
+          <pc:sldMk cId="744276305" sldId="719"/>
+        </pc:sldMkLst>
+      </pc:sldChg>
+      <pc:sldChg chg="modSp mod">
+        <pc:chgData name="Gerth Stølting Brodal" userId="04ef4784-6591-4f86-a140-f5c3b108582a" providerId="ADAL" clId="{2757BA76-BACE-4DC2-9A33-8497ADB6AF33}" dt="2025-04-26T15:59:56.800" v="0" actId="207"/>
+        <pc:sldMkLst>
+          <pc:docMk/>
+          <pc:sldMk cId="3472606578" sldId="720"/>
+        </pc:sldMkLst>
+        <pc:spChg chg="mod">
+          <ac:chgData name="Gerth Stølting Brodal" userId="04ef4784-6591-4f86-a140-f5c3b108582a" providerId="ADAL" clId="{2757BA76-BACE-4DC2-9A33-8497ADB6AF33}" dt="2025-04-26T15:59:56.800" v="0" actId="207"/>
+          <ac:spMkLst>
+            <pc:docMk/>
+            <pc:sldMk cId="3472606578" sldId="720"/>
+            <ac:spMk id="3" creationId="{00000000-0000-0000-0000-000000000000}"/>
+          </ac:spMkLst>
+        </pc:spChg>
+      </pc:sldChg>
+      <pc:sldChg chg="ord">
+        <pc:chgData name="Gerth Stølting Brodal" userId="04ef4784-6591-4f86-a140-f5c3b108582a" providerId="ADAL" clId="{2757BA76-BACE-4DC2-9A33-8497ADB6AF33}" dt="2025-04-26T16:03:31.808" v="33"/>
+        <pc:sldMkLst>
+          <pc:docMk/>
+          <pc:sldMk cId="2151226335" sldId="721"/>
+        </pc:sldMkLst>
+      </pc:sldChg>
+      <pc:sldChg chg="modSp mod">
+        <pc:chgData name="Gerth Stølting Brodal" userId="04ef4784-6591-4f86-a140-f5c3b108582a" providerId="ADAL" clId="{2757BA76-BACE-4DC2-9A33-8497ADB6AF33}" dt="2025-04-26T16:07:46.951" v="34" actId="14100"/>
+        <pc:sldMkLst>
+          <pc:docMk/>
+          <pc:sldMk cId="615192665" sldId="722"/>
+        </pc:sldMkLst>
+        <pc:spChg chg="mod">
+          <ac:chgData name="Gerth Stølting Brodal" userId="04ef4784-6591-4f86-a140-f5c3b108582a" providerId="ADAL" clId="{2757BA76-BACE-4DC2-9A33-8497ADB6AF33}" dt="2025-04-26T16:07:46.951" v="34" actId="14100"/>
+          <ac:spMkLst>
+            <pc:docMk/>
+            <pc:sldMk cId="615192665" sldId="722"/>
+            <ac:spMk id="3" creationId="{00000000-0000-0000-0000-000000000000}"/>
+          </ac:spMkLst>
+        </pc:spChg>
+      </pc:sldChg>
+      <pc:sldChg chg="ord">
+        <pc:chgData name="Gerth Stølting Brodal" userId="04ef4784-6591-4f86-a140-f5c3b108582a" providerId="ADAL" clId="{2757BA76-BACE-4DC2-9A33-8497ADB6AF33}" dt="2025-04-26T16:02:38.642" v="6"/>
+        <pc:sldMkLst>
+          <pc:docMk/>
+          <pc:sldMk cId="3232636054" sldId="724"/>
         </pc:sldMkLst>
       </pc:sldChg>
     </pc:docChg>
@@ -600,7 +476,7 @@
           <a:p>
             <a:fld id="{FB1A172F-81D4-4DC4-9113-1DBD56EC3646}" type="datetimeFigureOut">
               <a:rPr lang="en-US" smtClean="0"/>
-              <a:t>5/1/2024</a:t>
+              <a:t>4/26/2025</a:t>
             </a:fld>
             <a:endParaRPr lang="en-US"/>
           </a:p>
@@ -913,7 +789,7 @@
           <a:p>
             <a:r>
               <a:rPr lang="en-US" dirty="0"/>
-              <a:t>A text interface from the console</a:t>
+              <a:t>A basic text interface for a calculator from the console</a:t>
             </a:r>
             <a:endParaRPr lang="da-DK" dirty="0"/>
           </a:p>
@@ -1278,7 +1154,7 @@
           <a:p>
             <a:fld id="{CD563DD8-32AB-41BE-B1C6-8EAC45222ACE}" type="slidenum">
               <a:rPr lang="en-US" smtClean="0"/>
-              <a:t>6</a:t>
+              <a:t>7</a:t>
             </a:fld>
             <a:endParaRPr lang="en-US"/>
           </a:p>
@@ -2168,7 +2044,7 @@
           <a:p>
             <a:fld id="{0560A9CD-0304-4E0B-9E82-E7E0115DE05B}" type="datetimeFigureOut">
               <a:rPr lang="en-US" smtClean="0"/>
-              <a:t>5/1/2024</a:t>
+              <a:t>4/26/2025</a:t>
             </a:fld>
             <a:endParaRPr lang="en-US"/>
           </a:p>
@@ -2336,7 +2212,7 @@
           <a:p>
             <a:fld id="{0560A9CD-0304-4E0B-9E82-E7E0115DE05B}" type="datetimeFigureOut">
               <a:rPr lang="en-US" smtClean="0"/>
-              <a:t>5/1/2024</a:t>
+              <a:t>4/26/2025</a:t>
             </a:fld>
             <a:endParaRPr lang="en-US"/>
           </a:p>
@@ -2514,7 +2390,7 @@
           <a:p>
             <a:fld id="{0560A9CD-0304-4E0B-9E82-E7E0115DE05B}" type="datetimeFigureOut">
               <a:rPr lang="en-US" smtClean="0"/>
-              <a:t>5/1/2024</a:t>
+              <a:t>4/26/2025</a:t>
             </a:fld>
             <a:endParaRPr lang="en-US"/>
           </a:p>
@@ -2697,7 +2573,7 @@
           <a:p>
             <a:fld id="{0560A9CD-0304-4E0B-9E82-E7E0115DE05B}" type="datetimeFigureOut">
               <a:rPr lang="en-US" smtClean="0"/>
-              <a:t>5/1/2024</a:t>
+              <a:t>4/26/2025</a:t>
             </a:fld>
             <a:endParaRPr lang="en-US"/>
           </a:p>
@@ -2942,7 +2818,7 @@
           <a:p>
             <a:fld id="{0560A9CD-0304-4E0B-9E82-E7E0115DE05B}" type="datetimeFigureOut">
               <a:rPr lang="en-US" smtClean="0"/>
-              <a:t>5/1/2024</a:t>
+              <a:t>4/26/2025</a:t>
             </a:fld>
             <a:endParaRPr lang="en-US"/>
           </a:p>
@@ -3171,7 +3047,7 @@
           <a:p>
             <a:fld id="{0560A9CD-0304-4E0B-9E82-E7E0115DE05B}" type="datetimeFigureOut">
               <a:rPr lang="en-US" smtClean="0"/>
-              <a:t>5/1/2024</a:t>
+              <a:t>4/26/2025</a:t>
             </a:fld>
             <a:endParaRPr lang="en-US"/>
           </a:p>
@@ -3535,7 +3411,7 @@
           <a:p>
             <a:fld id="{0560A9CD-0304-4E0B-9E82-E7E0115DE05B}" type="datetimeFigureOut">
               <a:rPr lang="en-US" smtClean="0"/>
-              <a:t>5/1/2024</a:t>
+              <a:t>4/26/2025</a:t>
             </a:fld>
             <a:endParaRPr lang="en-US"/>
           </a:p>
@@ -3652,7 +3528,7 @@
           <a:p>
             <a:fld id="{0560A9CD-0304-4E0B-9E82-E7E0115DE05B}" type="datetimeFigureOut">
               <a:rPr lang="en-US" smtClean="0"/>
-              <a:t>5/1/2024</a:t>
+              <a:t>4/26/2025</a:t>
             </a:fld>
             <a:endParaRPr lang="en-US"/>
           </a:p>
@@ -3747,7 +3623,7 @@
           <a:p>
             <a:fld id="{0560A9CD-0304-4E0B-9E82-E7E0115DE05B}" type="datetimeFigureOut">
               <a:rPr lang="en-US" smtClean="0"/>
-              <a:t>5/1/2024</a:t>
+              <a:t>4/26/2025</a:t>
             </a:fld>
             <a:endParaRPr lang="en-US"/>
           </a:p>
@@ -4022,7 +3898,7 @@
           <a:p>
             <a:fld id="{0560A9CD-0304-4E0B-9E82-E7E0115DE05B}" type="datetimeFigureOut">
               <a:rPr lang="en-US" smtClean="0"/>
-              <a:t>5/1/2024</a:t>
+              <a:t>4/26/2025</a:t>
             </a:fld>
             <a:endParaRPr lang="en-US"/>
           </a:p>
@@ -4274,7 +4150,7 @@
           <a:p>
             <a:fld id="{0560A9CD-0304-4E0B-9E82-E7E0115DE05B}" type="datetimeFigureOut">
               <a:rPr lang="en-US" smtClean="0"/>
-              <a:t>5/1/2024</a:t>
+              <a:t>4/26/2025</a:t>
             </a:fld>
             <a:endParaRPr lang="en-US"/>
           </a:p>
@@ -4485,7 +4361,7 @@
           <a:p>
             <a:fld id="{0560A9CD-0304-4E0B-9E82-E7E0115DE05B}" type="datetimeFigureOut">
               <a:rPr lang="en-US" smtClean="0"/>
-              <a:t>5/1/2024</a:t>
+              <a:t>4/26/2025</a:t>
             </a:fld>
             <a:endParaRPr lang="en-US"/>
           </a:p>
@@ -15016,256 +14892,23 @@
           <a:chExt cx="0" cy="0"/>
         </a:xfrm>
       </p:grpSpPr>
-      <p:sp>
-        <p:nvSpPr>
-          <p:cNvPr id="2" name="Title 1"/>
-          <p:cNvSpPr>
-            <a:spLocks noGrp="1"/>
-          </p:cNvSpPr>
-          <p:nvPr>
-            <p:ph type="title"/>
-          </p:nvPr>
-        </p:nvSpPr>
-        <p:spPr/>
-        <p:txBody>
-          <a:bodyPr/>
-          <a:lstStyle/>
-          <a:p>
-            <a:r>
-              <a:rPr lang="en-US" dirty="0"/>
-              <a:t>Python GUI’s (Graphical Users Interfaces)</a:t>
-            </a:r>
-          </a:p>
-        </p:txBody>
-      </p:sp>
-      <p:sp>
-        <p:nvSpPr>
-          <p:cNvPr id="3" name="Content Placeholder 2"/>
-          <p:cNvSpPr>
-            <a:spLocks noGrp="1"/>
-          </p:cNvSpPr>
-          <p:nvPr>
-            <p:ph idx="1"/>
-          </p:nvPr>
-        </p:nvSpPr>
-        <p:spPr>
-          <a:xfrm>
-            <a:off x="838200" y="1690688"/>
-            <a:ext cx="10515600" cy="5167312"/>
-          </a:xfrm>
-        </p:spPr>
-        <p:txBody>
-          <a:bodyPr>
-            <a:normAutofit lnSpcReduction="10000"/>
-          </a:bodyPr>
-          <a:lstStyle/>
-          <a:p>
-            <a:r>
-              <a:rPr lang="en-US" dirty="0"/>
-              <a:t>There is a long list of GUI frameworks and toolkits, designer tools</a:t>
-            </a:r>
-          </a:p>
-          <a:p>
-            <a:pPr lvl="1"/>
-            <a:r>
-              <a:rPr lang="en-US" dirty="0"/>
-              <a:t>we will only briefly look at </a:t>
-            </a:r>
-            <a:r>
-              <a:rPr lang="en-US" dirty="0" err="1"/>
-              <a:t>Tkinter</a:t>
-            </a:r>
-            <a:endParaRPr lang="en-US" dirty="0"/>
-          </a:p>
-          <a:p>
-            <a:r>
-              <a:rPr lang="en-US" dirty="0"/>
-              <a:t>GUI are, opposed to a text terminal,</a:t>
-            </a:r>
-            <a:br>
-              <a:rPr lang="en-US" dirty="0"/>
-            </a:br>
-            <a:r>
-              <a:rPr lang="en-US" dirty="0">
-                <a:solidFill>
-                  <a:srgbClr val="C00000"/>
-                </a:solidFill>
-              </a:rPr>
-              <a:t>easier to use</a:t>
-            </a:r>
-            <a:r>
-              <a:rPr lang="en-US" dirty="0"/>
-              <a:t>, </a:t>
-            </a:r>
-            <a:r>
-              <a:rPr lang="en-US" dirty="0">
-                <a:solidFill>
-                  <a:srgbClr val="C00000"/>
-                </a:solidFill>
-              </a:rPr>
-              <a:t>more intuitive</a:t>
-            </a:r>
-            <a:r>
-              <a:rPr lang="en-US" dirty="0"/>
-              <a:t> and </a:t>
-            </a:r>
-            <a:r>
-              <a:rPr lang="en-US" dirty="0">
-                <a:solidFill>
-                  <a:srgbClr val="C00000"/>
-                </a:solidFill>
-              </a:rPr>
-              <a:t>flexible</a:t>
-            </a:r>
-          </a:p>
-          <a:p>
-            <a:r>
-              <a:rPr lang="en-US" dirty="0"/>
-              <a:t>Windows, icons, menus, buttons, scrollbars </a:t>
-            </a:r>
-            <a:br>
-              <a:rPr lang="en-US" dirty="0"/>
-            </a:br>
-            <a:r>
-              <a:rPr lang="en-US" dirty="0"/>
-              <a:t>mouse / touch / keyboard interaction etc.</a:t>
-            </a:r>
-          </a:p>
-          <a:p>
-            <a:r>
-              <a:rPr lang="en-US" dirty="0"/>
-              <a:t>Operating system (e.g. Windows, </a:t>
-            </a:r>
-            <a:r>
-              <a:rPr lang="en-US" dirty="0" err="1"/>
-              <a:t>maxOS</a:t>
-            </a:r>
-            <a:r>
-              <a:rPr lang="en-US" dirty="0"/>
-              <a:t>, iOS, </a:t>
-            </a:r>
-            <a:br>
-              <a:rPr lang="en-US" dirty="0"/>
-            </a:br>
-            <a:r>
-              <a:rPr lang="en-US" dirty="0"/>
-              <a:t>Linux, Android) provides basic functionality</a:t>
-            </a:r>
-            <a:br>
-              <a:rPr lang="en-US" dirty="0"/>
-            </a:br>
-            <a:r>
-              <a:rPr lang="en-US" dirty="0"/>
-              <a:t>in particular a </a:t>
-            </a:r>
-            <a:r>
-              <a:rPr lang="en-US" dirty="0">
-                <a:solidFill>
-                  <a:srgbClr val="C00000"/>
-                </a:solidFill>
-              </a:rPr>
-              <a:t>window manager</a:t>
-            </a:r>
-          </a:p>
-          <a:p>
-            <a:r>
-              <a:rPr lang="en-US" dirty="0"/>
-              <a:t>Writing GUI applications from scratch can be </a:t>
-            </a:r>
-            <a:br>
-              <a:rPr lang="en-US" dirty="0"/>
-            </a:br>
-            <a:r>
-              <a:rPr lang="en-US" dirty="0"/>
-              <a:t>painful – frameworks try to provide all standard </a:t>
-            </a:r>
-            <a:br>
-              <a:rPr lang="en-US" dirty="0"/>
-            </a:br>
-            <a:r>
-              <a:rPr lang="en-US" dirty="0"/>
-              <a:t>functionality</a:t>
-            </a:r>
-          </a:p>
-          <a:p>
-            <a:endParaRPr lang="en-US" dirty="0"/>
-          </a:p>
-        </p:txBody>
-      </p:sp>
-      <p:sp>
-        <p:nvSpPr>
-          <p:cNvPr id="4" name="Rectangle 3"/>
-          <p:cNvSpPr/>
-          <p:nvPr/>
-        </p:nvSpPr>
-        <p:spPr>
-          <a:xfrm>
-            <a:off x="8053124" y="6350322"/>
-            <a:ext cx="3994812" cy="369332"/>
-          </a:xfrm>
-          <a:prstGeom prst="rect">
-            <a:avLst/>
-          </a:prstGeom>
-        </p:spPr>
-        <p:txBody>
-          <a:bodyPr wrap="none">
-            <a:spAutoFit/>
-          </a:bodyPr>
-          <a:lstStyle/>
-          <a:p>
-            <a:pPr algn="r"/>
-            <a:r>
-              <a:rPr lang="en-US" dirty="0">
-                <a:hlinkClick r:id="rId2"/>
-              </a:rPr>
-              <a:t>wiki.python.org/</a:t>
-            </a:r>
-            <a:r>
-              <a:rPr lang="en-US" dirty="0" err="1">
-                <a:hlinkClick r:id="rId2"/>
-              </a:rPr>
-              <a:t>moin</a:t>
-            </a:r>
-            <a:r>
-              <a:rPr lang="en-US" dirty="0">
-                <a:hlinkClick r:id="rId2"/>
-              </a:rPr>
-              <a:t>/</a:t>
-            </a:r>
-            <a:r>
-              <a:rPr lang="en-US" dirty="0" err="1">
-                <a:hlinkClick r:id="rId2"/>
-              </a:rPr>
-              <a:t>GuiProgramming</a:t>
-            </a:r>
-            <a:endParaRPr lang="en-US" dirty="0"/>
-          </a:p>
-        </p:txBody>
-      </p:sp>
       <p:pic>
         <p:nvPicPr>
-          <p:cNvPr id="5" name="Picture 4"/>
+          <p:cNvPr id="4" name="Picture 3"/>
           <p:cNvPicPr>
             <a:picLocks noChangeAspect="1"/>
           </p:cNvPicPr>
           <p:nvPr/>
         </p:nvPicPr>
-        <p:blipFill>
-          <a:blip r:embed="rId3" cstate="print">
-            <a:extLst>
-              <a:ext uri="{28A0092B-C50C-407E-A947-70E740481C1C}">
-                <a14:useLocalDpi xmlns:a14="http://schemas.microsoft.com/office/drawing/2010/main" val="0"/>
-              </a:ext>
-            </a:extLst>
-          </a:blip>
-          <a:stretch>
-            <a:fillRect/>
-          </a:stretch>
+        <p:blipFill rotWithShape="1">
+          <a:blip r:embed="rId2"/>
+          <a:srcRect l="12759" t="59602" r="12657"/>
+          <a:stretch/>
         </p:blipFill>
         <p:spPr>
           <a:xfrm>
-            <a:off x="8460606" y="2900063"/>
-            <a:ext cx="3459328" cy="2594496"/>
+            <a:off x="0" y="-55342"/>
+            <a:ext cx="12192000" cy="6913342"/>
           </a:xfrm>
           <a:prstGeom prst="rect">
             <a:avLst/>
@@ -15274,42 +14917,84 @@
       </p:pic>
       <p:sp>
         <p:nvSpPr>
-          <p:cNvPr id="6" name="Rectangle 5"/>
+          <p:cNvPr id="5" name="Rectangle 4"/>
           <p:cNvSpPr/>
           <p:nvPr/>
         </p:nvSpPr>
         <p:spPr>
           <a:xfrm>
-            <a:off x="8231529" y="5494559"/>
-            <a:ext cx="3917482" cy="307777"/>
+            <a:off x="7184571" y="4582886"/>
+            <a:ext cx="1665515" cy="293914"/>
+          </a:xfrm>
+          <a:prstGeom prst="rect">
+            <a:avLst/>
+          </a:prstGeom>
+          <a:solidFill>
+            <a:schemeClr val="bg1"/>
+          </a:solidFill>
+          <a:ln>
+            <a:noFill/>
+          </a:ln>
+        </p:spPr>
+        <p:style>
+          <a:lnRef idx="2">
+            <a:schemeClr val="accent1">
+              <a:shade val="50000"/>
+            </a:schemeClr>
+          </a:lnRef>
+          <a:fillRef idx="1">
+            <a:schemeClr val="accent1"/>
+          </a:fillRef>
+          <a:effectRef idx="0">
+            <a:schemeClr val="accent1"/>
+          </a:effectRef>
+          <a:fontRef idx="minor">
+            <a:schemeClr val="lt1"/>
+          </a:fontRef>
+        </p:style>
+        <p:txBody>
+          <a:bodyPr rtlCol="0" anchor="ctr"/>
+          <a:lstStyle/>
+          <a:p>
+            <a:pPr algn="ctr"/>
+            <a:endParaRPr lang="en-US"/>
+          </a:p>
+        </p:txBody>
+      </p:sp>
+      <p:pic>
+        <p:nvPicPr>
+          <p:cNvPr id="3" name="Picture 2">
+            <a:extLst>
+              <a:ext uri="{FF2B5EF4-FFF2-40B4-BE49-F238E27FC236}">
+                <a16:creationId xmlns:a16="http://schemas.microsoft.com/office/drawing/2014/main" id="{19C8794E-A018-4433-B6EB-3B14B3ABBA1D}"/>
+              </a:ext>
+            </a:extLst>
+          </p:cNvPr>
+          <p:cNvPicPr>
+            <a:picLocks noChangeAspect="1"/>
+          </p:cNvPicPr>
+          <p:nvPr/>
+        </p:nvPicPr>
+        <p:blipFill>
+          <a:blip r:embed="rId3"/>
+          <a:stretch>
+            <a:fillRect/>
+          </a:stretch>
+        </p:blipFill>
+        <p:spPr>
+          <a:xfrm>
+            <a:off x="0" y="10510"/>
+            <a:ext cx="12192000" cy="6858000"/>
           </a:xfrm>
           <a:prstGeom prst="rect">
             <a:avLst/>
           </a:prstGeom>
         </p:spPr>
-        <p:txBody>
-          <a:bodyPr wrap="square">
-            <a:spAutoFit/>
-          </a:bodyPr>
-          <a:lstStyle/>
-          <a:p>
-            <a:pPr algn="ctr"/>
-            <a:r>
-              <a:rPr lang="en-US" sz="1400" dirty="0"/>
-              <a:t>en.wikipedia.org/wiki/</a:t>
-            </a:r>
-            <a:r>
-              <a:rPr lang="en-US" sz="1400" dirty="0" err="1"/>
-              <a:t>Colossal_Cave_Adventure</a:t>
-            </a:r>
-            <a:endParaRPr lang="en-US" sz="1400" dirty="0"/>
-          </a:p>
-        </p:txBody>
-      </p:sp>
+      </p:pic>
     </p:spTree>
     <p:extLst>
       <p:ext uri="{BB962C8B-B14F-4D97-AF65-F5344CB8AC3E}">
-        <p14:creationId xmlns:p14="http://schemas.microsoft.com/office/powerpoint/2010/main" val="3472606578"/>
+        <p14:creationId xmlns:p14="http://schemas.microsoft.com/office/powerpoint/2010/main" val="3232636054"/>
       </p:ext>
     </p:extLst>
   </p:cSld>
@@ -15452,6 +15137,334 @@
           <a:lstStyle/>
           <a:p>
             <a:r>
+              <a:rPr lang="en-US" dirty="0"/>
+              <a:t>Python GUI’s (Graphical Users Interfaces)</a:t>
+            </a:r>
+          </a:p>
+        </p:txBody>
+      </p:sp>
+      <p:sp>
+        <p:nvSpPr>
+          <p:cNvPr id="3" name="Content Placeholder 2"/>
+          <p:cNvSpPr>
+            <a:spLocks noGrp="1"/>
+          </p:cNvSpPr>
+          <p:nvPr>
+            <p:ph idx="1"/>
+          </p:nvPr>
+        </p:nvSpPr>
+        <p:spPr>
+          <a:xfrm>
+            <a:off x="838200" y="1690688"/>
+            <a:ext cx="10515600" cy="5167312"/>
+          </a:xfrm>
+        </p:spPr>
+        <p:txBody>
+          <a:bodyPr>
+            <a:normAutofit lnSpcReduction="10000"/>
+          </a:bodyPr>
+          <a:lstStyle/>
+          <a:p>
+            <a:r>
+              <a:rPr lang="en-US" dirty="0"/>
+              <a:t>There is a long list of GUI frameworks and toolkits, designer tools</a:t>
+            </a:r>
+          </a:p>
+          <a:p>
+            <a:pPr lvl="1"/>
+            <a:r>
+              <a:rPr lang="en-US" dirty="0"/>
+              <a:t>we will only briefly look at </a:t>
+            </a:r>
+            <a:r>
+              <a:rPr lang="en-US" dirty="0" err="1">
+                <a:solidFill>
+                  <a:srgbClr val="C00000"/>
+                </a:solidFill>
+              </a:rPr>
+              <a:t>Tkinter</a:t>
+            </a:r>
+            <a:endParaRPr lang="en-US" dirty="0">
+              <a:solidFill>
+                <a:srgbClr val="C00000"/>
+              </a:solidFill>
+            </a:endParaRPr>
+          </a:p>
+          <a:p>
+            <a:r>
+              <a:rPr lang="en-US" dirty="0"/>
+              <a:t>GUI are, opposed to a text terminal,</a:t>
+            </a:r>
+            <a:br>
+              <a:rPr lang="en-US" dirty="0"/>
+            </a:br>
+            <a:r>
+              <a:rPr lang="en-US" dirty="0">
+                <a:solidFill>
+                  <a:srgbClr val="C00000"/>
+                </a:solidFill>
+              </a:rPr>
+              <a:t>easier to use</a:t>
+            </a:r>
+            <a:r>
+              <a:rPr lang="en-US" dirty="0"/>
+              <a:t>, </a:t>
+            </a:r>
+            <a:r>
+              <a:rPr lang="en-US" dirty="0">
+                <a:solidFill>
+                  <a:srgbClr val="C00000"/>
+                </a:solidFill>
+              </a:rPr>
+              <a:t>more intuitive</a:t>
+            </a:r>
+            <a:r>
+              <a:rPr lang="en-US" dirty="0"/>
+              <a:t> and </a:t>
+            </a:r>
+            <a:r>
+              <a:rPr lang="en-US" dirty="0">
+                <a:solidFill>
+                  <a:srgbClr val="C00000"/>
+                </a:solidFill>
+              </a:rPr>
+              <a:t>flexible</a:t>
+            </a:r>
+          </a:p>
+          <a:p>
+            <a:r>
+              <a:rPr lang="en-US" dirty="0"/>
+              <a:t>Windows, icons, menus, buttons, scrollbars </a:t>
+            </a:r>
+            <a:br>
+              <a:rPr lang="en-US" dirty="0"/>
+            </a:br>
+            <a:r>
+              <a:rPr lang="en-US" dirty="0"/>
+              <a:t>mouse / touch / keyboard interaction etc.</a:t>
+            </a:r>
+          </a:p>
+          <a:p>
+            <a:r>
+              <a:rPr lang="en-US" dirty="0"/>
+              <a:t>Operating system (e.g. Windows, </a:t>
+            </a:r>
+            <a:r>
+              <a:rPr lang="en-US" dirty="0" err="1"/>
+              <a:t>maxOS</a:t>
+            </a:r>
+            <a:r>
+              <a:rPr lang="en-US" dirty="0"/>
+              <a:t>, iOS, </a:t>
+            </a:r>
+            <a:br>
+              <a:rPr lang="en-US" dirty="0"/>
+            </a:br>
+            <a:r>
+              <a:rPr lang="en-US" dirty="0"/>
+              <a:t>Linux, Android) provides basic functionality</a:t>
+            </a:r>
+            <a:br>
+              <a:rPr lang="en-US" dirty="0"/>
+            </a:br>
+            <a:r>
+              <a:rPr lang="en-US" dirty="0"/>
+              <a:t>in particular a </a:t>
+            </a:r>
+            <a:r>
+              <a:rPr lang="en-US" dirty="0">
+                <a:solidFill>
+                  <a:srgbClr val="C00000"/>
+                </a:solidFill>
+              </a:rPr>
+              <a:t>window manager</a:t>
+            </a:r>
+          </a:p>
+          <a:p>
+            <a:r>
+              <a:rPr lang="en-US" dirty="0"/>
+              <a:t>Writing GUI applications from scratch can be </a:t>
+            </a:r>
+            <a:br>
+              <a:rPr lang="en-US" dirty="0"/>
+            </a:br>
+            <a:r>
+              <a:rPr lang="en-US" dirty="0"/>
+              <a:t>painful – frameworks try to provide all standard </a:t>
+            </a:r>
+            <a:br>
+              <a:rPr lang="en-US" dirty="0"/>
+            </a:br>
+            <a:r>
+              <a:rPr lang="en-US" dirty="0"/>
+              <a:t>functionality</a:t>
+            </a:r>
+          </a:p>
+          <a:p>
+            <a:endParaRPr lang="en-US" dirty="0"/>
+          </a:p>
+        </p:txBody>
+      </p:sp>
+      <p:sp>
+        <p:nvSpPr>
+          <p:cNvPr id="4" name="Rectangle 3"/>
+          <p:cNvSpPr/>
+          <p:nvPr/>
+        </p:nvSpPr>
+        <p:spPr>
+          <a:xfrm>
+            <a:off x="8053124" y="6350322"/>
+            <a:ext cx="3994812" cy="369332"/>
+          </a:xfrm>
+          <a:prstGeom prst="rect">
+            <a:avLst/>
+          </a:prstGeom>
+        </p:spPr>
+        <p:txBody>
+          <a:bodyPr wrap="none">
+            <a:spAutoFit/>
+          </a:bodyPr>
+          <a:lstStyle/>
+          <a:p>
+            <a:pPr algn="r"/>
+            <a:r>
+              <a:rPr lang="en-US" dirty="0">
+                <a:hlinkClick r:id="rId2"/>
+              </a:rPr>
+              <a:t>wiki.python.org/</a:t>
+            </a:r>
+            <a:r>
+              <a:rPr lang="en-US" dirty="0" err="1">
+                <a:hlinkClick r:id="rId2"/>
+              </a:rPr>
+              <a:t>moin</a:t>
+            </a:r>
+            <a:r>
+              <a:rPr lang="en-US" dirty="0">
+                <a:hlinkClick r:id="rId2"/>
+              </a:rPr>
+              <a:t>/</a:t>
+            </a:r>
+            <a:r>
+              <a:rPr lang="en-US" dirty="0" err="1">
+                <a:hlinkClick r:id="rId2"/>
+              </a:rPr>
+              <a:t>GuiProgramming</a:t>
+            </a:r>
+            <a:endParaRPr lang="en-US" dirty="0"/>
+          </a:p>
+        </p:txBody>
+      </p:sp>
+      <p:pic>
+        <p:nvPicPr>
+          <p:cNvPr id="5" name="Picture 4"/>
+          <p:cNvPicPr>
+            <a:picLocks noChangeAspect="1"/>
+          </p:cNvPicPr>
+          <p:nvPr/>
+        </p:nvPicPr>
+        <p:blipFill>
+          <a:blip r:embed="rId3" cstate="print">
+            <a:extLst>
+              <a:ext uri="{28A0092B-C50C-407E-A947-70E740481C1C}">
+                <a14:useLocalDpi xmlns:a14="http://schemas.microsoft.com/office/drawing/2010/main" val="0"/>
+              </a:ext>
+            </a:extLst>
+          </a:blip>
+          <a:stretch>
+            <a:fillRect/>
+          </a:stretch>
+        </p:blipFill>
+        <p:spPr>
+          <a:xfrm>
+            <a:off x="8460606" y="2900063"/>
+            <a:ext cx="3459328" cy="2594496"/>
+          </a:xfrm>
+          <a:prstGeom prst="rect">
+            <a:avLst/>
+          </a:prstGeom>
+        </p:spPr>
+      </p:pic>
+      <p:sp>
+        <p:nvSpPr>
+          <p:cNvPr id="6" name="Rectangle 5"/>
+          <p:cNvSpPr/>
+          <p:nvPr/>
+        </p:nvSpPr>
+        <p:spPr>
+          <a:xfrm>
+            <a:off x="8231529" y="5494559"/>
+            <a:ext cx="3917482" cy="307777"/>
+          </a:xfrm>
+          <a:prstGeom prst="rect">
+            <a:avLst/>
+          </a:prstGeom>
+        </p:spPr>
+        <p:txBody>
+          <a:bodyPr wrap="square">
+            <a:spAutoFit/>
+          </a:bodyPr>
+          <a:lstStyle/>
+          <a:p>
+            <a:pPr algn="ctr"/>
+            <a:r>
+              <a:rPr lang="en-US" sz="1400" dirty="0"/>
+              <a:t>en.wikipedia.org/wiki/</a:t>
+            </a:r>
+            <a:r>
+              <a:rPr lang="en-US" sz="1400" dirty="0" err="1"/>
+              <a:t>Colossal_Cave_Adventure</a:t>
+            </a:r>
+            <a:endParaRPr lang="en-US" sz="1400" dirty="0"/>
+          </a:p>
+        </p:txBody>
+      </p:sp>
+    </p:spTree>
+    <p:extLst>
+      <p:ext uri="{BB962C8B-B14F-4D97-AF65-F5344CB8AC3E}">
+        <p14:creationId xmlns:p14="http://schemas.microsoft.com/office/powerpoint/2010/main" val="3472606578"/>
+      </p:ext>
+    </p:extLst>
+  </p:cSld>
+  <p:clrMapOvr>
+    <a:masterClrMapping/>
+  </p:clrMapOvr>
+</p:sld>
+</file>
+
+<file path=ppt/slides/slide6.xml><?xml version="1.0" encoding="utf-8"?>
+<p:sld xmlns:a="http://schemas.openxmlformats.org/drawingml/2006/main" xmlns:r="http://schemas.openxmlformats.org/officeDocument/2006/relationships" xmlns:p="http://schemas.openxmlformats.org/presentationml/2006/main">
+  <p:cSld>
+    <p:spTree>
+      <p:nvGrpSpPr>
+        <p:cNvPr id="1" name=""/>
+        <p:cNvGrpSpPr/>
+        <p:nvPr/>
+      </p:nvGrpSpPr>
+      <p:grpSpPr>
+        <a:xfrm>
+          <a:off x="0" y="0"/>
+          <a:ext cx="0" cy="0"/>
+          <a:chOff x="0" y="0"/>
+          <a:chExt cx="0" cy="0"/>
+        </a:xfrm>
+      </p:grpSpPr>
+      <p:sp>
+        <p:nvSpPr>
+          <p:cNvPr id="2" name="Title 1"/>
+          <p:cNvSpPr>
+            <a:spLocks noGrp="1"/>
+          </p:cNvSpPr>
+          <p:nvPr>
+            <p:ph type="title"/>
+          </p:nvPr>
+        </p:nvSpPr>
+        <p:spPr/>
+        <p:txBody>
+          <a:bodyPr/>
+          <a:lstStyle/>
+          <a:p>
+            <a:r>
               <a:rPr lang="en-US" dirty="0" err="1"/>
               <a:t>Tkinter</a:t>
             </a:r>
@@ -15471,8 +15484,8 @@
         </p:nvSpPr>
         <p:spPr>
           <a:xfrm>
-            <a:off x="838200" y="1738536"/>
-            <a:ext cx="10515600" cy="5032375"/>
+            <a:off x="838199" y="1738536"/>
+            <a:ext cx="10632141" cy="5032375"/>
           </a:xfrm>
         </p:spPr>
         <p:txBody>
@@ -15973,7 +15986,7 @@
 </p:sld>
 </file>
 
-<file path=ppt/slides/slide6.xml><?xml version="1.0" encoding="utf-8"?>
+<file path=ppt/slides/slide7.xml><?xml version="1.0" encoding="utf-8"?>
 <p:sld xmlns:a="http://schemas.openxmlformats.org/drawingml/2006/main" xmlns:r="http://schemas.openxmlformats.org/officeDocument/2006/relationships" xmlns:p="http://schemas.openxmlformats.org/presentationml/2006/main">
   <p:cSld>
     <p:spTree>
@@ -16145,135 +16158,6 @@
     <p:extLst>
       <p:ext uri="{BB962C8B-B14F-4D97-AF65-F5344CB8AC3E}">
         <p14:creationId xmlns:p14="http://schemas.microsoft.com/office/powerpoint/2010/main" val="9140677"/>
-      </p:ext>
-    </p:extLst>
-  </p:cSld>
-  <p:clrMapOvr>
-    <a:masterClrMapping/>
-  </p:clrMapOvr>
-</p:sld>
-</file>
-
-<file path=ppt/slides/slide7.xml><?xml version="1.0" encoding="utf-8"?>
-<p:sld xmlns:a="http://schemas.openxmlformats.org/drawingml/2006/main" xmlns:r="http://schemas.openxmlformats.org/officeDocument/2006/relationships" xmlns:p="http://schemas.openxmlformats.org/presentationml/2006/main">
-  <p:cSld>
-    <p:spTree>
-      <p:nvGrpSpPr>
-        <p:cNvPr id="1" name=""/>
-        <p:cNvGrpSpPr/>
-        <p:nvPr/>
-      </p:nvGrpSpPr>
-      <p:grpSpPr>
-        <a:xfrm>
-          <a:off x="0" y="0"/>
-          <a:ext cx="0" cy="0"/>
-          <a:chOff x="0" y="0"/>
-          <a:chExt cx="0" cy="0"/>
-        </a:xfrm>
-      </p:grpSpPr>
-      <p:pic>
-        <p:nvPicPr>
-          <p:cNvPr id="4" name="Picture 3"/>
-          <p:cNvPicPr>
-            <a:picLocks noChangeAspect="1"/>
-          </p:cNvPicPr>
-          <p:nvPr/>
-        </p:nvPicPr>
-        <p:blipFill rotWithShape="1">
-          <a:blip r:embed="rId2"/>
-          <a:srcRect l="12759" t="59602" r="12657"/>
-          <a:stretch/>
-        </p:blipFill>
-        <p:spPr>
-          <a:xfrm>
-            <a:off x="0" y="-55342"/>
-            <a:ext cx="12192000" cy="6913342"/>
-          </a:xfrm>
-          <a:prstGeom prst="rect">
-            <a:avLst/>
-          </a:prstGeom>
-        </p:spPr>
-      </p:pic>
-      <p:sp>
-        <p:nvSpPr>
-          <p:cNvPr id="5" name="Rectangle 4"/>
-          <p:cNvSpPr/>
-          <p:nvPr/>
-        </p:nvSpPr>
-        <p:spPr>
-          <a:xfrm>
-            <a:off x="7184571" y="4582886"/>
-            <a:ext cx="1665515" cy="293914"/>
-          </a:xfrm>
-          <a:prstGeom prst="rect">
-            <a:avLst/>
-          </a:prstGeom>
-          <a:solidFill>
-            <a:schemeClr val="bg1"/>
-          </a:solidFill>
-          <a:ln>
-            <a:noFill/>
-          </a:ln>
-        </p:spPr>
-        <p:style>
-          <a:lnRef idx="2">
-            <a:schemeClr val="accent1">
-              <a:shade val="50000"/>
-            </a:schemeClr>
-          </a:lnRef>
-          <a:fillRef idx="1">
-            <a:schemeClr val="accent1"/>
-          </a:fillRef>
-          <a:effectRef idx="0">
-            <a:schemeClr val="accent1"/>
-          </a:effectRef>
-          <a:fontRef idx="minor">
-            <a:schemeClr val="lt1"/>
-          </a:fontRef>
-        </p:style>
-        <p:txBody>
-          <a:bodyPr rtlCol="0" anchor="ctr"/>
-          <a:lstStyle/>
-          <a:p>
-            <a:pPr algn="ctr"/>
-            <a:endParaRPr lang="en-US"/>
-          </a:p>
-        </p:txBody>
-      </p:sp>
-      <p:pic>
-        <p:nvPicPr>
-          <p:cNvPr id="3" name="Picture 2">
-            <a:extLst>
-              <a:ext uri="{FF2B5EF4-FFF2-40B4-BE49-F238E27FC236}">
-                <a16:creationId xmlns:a16="http://schemas.microsoft.com/office/drawing/2014/main" id="{19C8794E-A018-4433-B6EB-3B14B3ABBA1D}"/>
-              </a:ext>
-            </a:extLst>
-          </p:cNvPr>
-          <p:cNvPicPr>
-            <a:picLocks noChangeAspect="1"/>
-          </p:cNvPicPr>
-          <p:nvPr/>
-        </p:nvPicPr>
-        <p:blipFill>
-          <a:blip r:embed="rId3"/>
-          <a:stretch>
-            <a:fillRect/>
-          </a:stretch>
-        </p:blipFill>
-        <p:spPr>
-          <a:xfrm>
-            <a:off x="0" y="10510"/>
-            <a:ext cx="12192000" cy="6858000"/>
-          </a:xfrm>
-          <a:prstGeom prst="rect">
-            <a:avLst/>
-          </a:prstGeom>
-        </p:spPr>
-      </p:pic>
-    </p:spTree>
-    <p:extLst>
-      <p:ext uri="{BB962C8B-B14F-4D97-AF65-F5344CB8AC3E}">
-        <p14:creationId xmlns:p14="http://schemas.microsoft.com/office/powerpoint/2010/main" val="3232636054"/>
       </p:ext>
     </p:extLst>
   </p:cSld>

</xml_diff>